<commit_message>
update cog switch buttons
</commit_message>
<xml_diff>
--- a/instructions/affflex.pptx
+++ b/instructions/affflex.pptx
@@ -9,17 +9,13 @@
     <p:sldId id="257" r:id="rId3"/>
     <p:sldId id="259" r:id="rId4"/>
     <p:sldId id="271" r:id="rId5"/>
-    <p:sldId id="260" r:id="rId6"/>
-    <p:sldId id="261" r:id="rId7"/>
-    <p:sldId id="262" r:id="rId8"/>
-    <p:sldId id="263" r:id="rId9"/>
-    <p:sldId id="264" r:id="rId10"/>
-    <p:sldId id="265" r:id="rId11"/>
-    <p:sldId id="267" r:id="rId12"/>
-    <p:sldId id="266" r:id="rId13"/>
-    <p:sldId id="268" r:id="rId14"/>
-    <p:sldId id="269" r:id="rId15"/>
-    <p:sldId id="270" r:id="rId16"/>
+    <p:sldId id="265" r:id="rId6"/>
+    <p:sldId id="272" r:id="rId7"/>
+    <p:sldId id="278" r:id="rId8"/>
+    <p:sldId id="280" r:id="rId9"/>
+    <p:sldId id="281" r:id="rId10"/>
+    <p:sldId id="282" r:id="rId11"/>
+    <p:sldId id="270" r:id="rId12"/>
   </p:sldIdLst>
   <p:sldSz cx="12192000" cy="6858000"/>
   <p:notesSz cx="6858000" cy="9144000"/>
@@ -118,6 +114,11 @@
       </a:defRPr>
     </a:lvl9pPr>
   </p:defaultTextStyle>
+  <p:extLst>
+    <p:ext uri="{EFAFB233-063F-42B5-8137-9DF3F51BA10A}">
+      <p15:sldGuideLst xmlns:p15="http://schemas.microsoft.com/office/powerpoint/2012/main"/>
+    </p:ext>
+  </p:extLst>
 </p:presentation>
 </file>
 
@@ -264,7 +265,7 @@
           <a:p>
             <a:fld id="{A367DB66-16AD-4D3E-9476-904D5CB20BD0}" type="datetimeFigureOut">
               <a:rPr lang="en-US" smtClean="0"/>
-              <a:t>8/30/2021</a:t>
+              <a:t>1/14/2022</a:t>
             </a:fld>
             <a:endParaRPr lang="en-US"/>
           </a:p>
@@ -434,7 +435,7 @@
           <a:p>
             <a:fld id="{A367DB66-16AD-4D3E-9476-904D5CB20BD0}" type="datetimeFigureOut">
               <a:rPr lang="en-US" smtClean="0"/>
-              <a:t>8/30/2021</a:t>
+              <a:t>1/14/2022</a:t>
             </a:fld>
             <a:endParaRPr lang="en-US"/>
           </a:p>
@@ -614,7 +615,7 @@
           <a:p>
             <a:fld id="{A367DB66-16AD-4D3E-9476-904D5CB20BD0}" type="datetimeFigureOut">
               <a:rPr lang="en-US" smtClean="0"/>
-              <a:t>8/30/2021</a:t>
+              <a:t>1/14/2022</a:t>
             </a:fld>
             <a:endParaRPr lang="en-US"/>
           </a:p>
@@ -784,7 +785,7 @@
           <a:p>
             <a:fld id="{A367DB66-16AD-4D3E-9476-904D5CB20BD0}" type="datetimeFigureOut">
               <a:rPr lang="en-US" smtClean="0"/>
-              <a:t>8/30/2021</a:t>
+              <a:t>1/14/2022</a:t>
             </a:fld>
             <a:endParaRPr lang="en-US"/>
           </a:p>
@@ -1030,7 +1031,7 @@
           <a:p>
             <a:fld id="{A367DB66-16AD-4D3E-9476-904D5CB20BD0}" type="datetimeFigureOut">
               <a:rPr lang="en-US" smtClean="0"/>
-              <a:t>8/30/2021</a:t>
+              <a:t>1/14/2022</a:t>
             </a:fld>
             <a:endParaRPr lang="en-US"/>
           </a:p>
@@ -1262,7 +1263,7 @@
           <a:p>
             <a:fld id="{A367DB66-16AD-4D3E-9476-904D5CB20BD0}" type="datetimeFigureOut">
               <a:rPr lang="en-US" smtClean="0"/>
-              <a:t>8/30/2021</a:t>
+              <a:t>1/14/2022</a:t>
             </a:fld>
             <a:endParaRPr lang="en-US"/>
           </a:p>
@@ -1629,7 +1630,7 @@
           <a:p>
             <a:fld id="{A367DB66-16AD-4D3E-9476-904D5CB20BD0}" type="datetimeFigureOut">
               <a:rPr lang="en-US" smtClean="0"/>
-              <a:t>8/30/2021</a:t>
+              <a:t>1/14/2022</a:t>
             </a:fld>
             <a:endParaRPr lang="en-US"/>
           </a:p>
@@ -1747,7 +1748,7 @@
           <a:p>
             <a:fld id="{A367DB66-16AD-4D3E-9476-904D5CB20BD0}" type="datetimeFigureOut">
               <a:rPr lang="en-US" smtClean="0"/>
-              <a:t>8/30/2021</a:t>
+              <a:t>1/14/2022</a:t>
             </a:fld>
             <a:endParaRPr lang="en-US"/>
           </a:p>
@@ -1842,7 +1843,7 @@
           <a:p>
             <a:fld id="{A367DB66-16AD-4D3E-9476-904D5CB20BD0}" type="datetimeFigureOut">
               <a:rPr lang="en-US" smtClean="0"/>
-              <a:t>8/30/2021</a:t>
+              <a:t>1/14/2022</a:t>
             </a:fld>
             <a:endParaRPr lang="en-US"/>
           </a:p>
@@ -2119,7 +2120,7 @@
           <a:p>
             <a:fld id="{A367DB66-16AD-4D3E-9476-904D5CB20BD0}" type="datetimeFigureOut">
               <a:rPr lang="en-US" smtClean="0"/>
-              <a:t>8/30/2021</a:t>
+              <a:t>1/14/2022</a:t>
             </a:fld>
             <a:endParaRPr lang="en-US"/>
           </a:p>
@@ -2376,7 +2377,7 @@
           <a:p>
             <a:fld id="{A367DB66-16AD-4D3E-9476-904D5CB20BD0}" type="datetimeFigureOut">
               <a:rPr lang="en-US" smtClean="0"/>
-              <a:t>8/30/2021</a:t>
+              <a:t>1/14/2022</a:t>
             </a:fld>
             <a:endParaRPr lang="en-US"/>
           </a:p>
@@ -2589,7 +2590,7 @@
           <a:p>
             <a:fld id="{A367DB66-16AD-4D3E-9476-904D5CB20BD0}" type="datetimeFigureOut">
               <a:rPr lang="en-US" smtClean="0"/>
-              <a:t>8/30/2021</a:t>
+              <a:t>1/14/2022</a:t>
             </a:fld>
             <a:endParaRPr lang="en-US"/>
           </a:p>
@@ -3077,143 +3078,6 @@
           <a:chExt cx="0" cy="0"/>
         </a:xfrm>
       </p:grpSpPr>
-      <p:sp>
-        <p:nvSpPr>
-          <p:cNvPr id="4" name="TextBox 3">
-            <a:extLst>
-              <a:ext uri="{FF2B5EF4-FFF2-40B4-BE49-F238E27FC236}">
-                <a16:creationId xmlns:a16="http://schemas.microsoft.com/office/drawing/2014/main" id="{045EBAC0-D53D-4EA9-B71F-B4ABEF313ECB}"/>
-              </a:ext>
-            </a:extLst>
-          </p:cNvPr>
-          <p:cNvSpPr txBox="1"/>
-          <p:nvPr/>
-        </p:nvSpPr>
-        <p:spPr>
-          <a:xfrm>
-            <a:off x="5847374" y="847899"/>
-            <a:ext cx="497252" cy="923330"/>
-          </a:xfrm>
-          <a:prstGeom prst="rect">
-            <a:avLst/>
-          </a:prstGeom>
-          <a:noFill/>
-        </p:spPr>
-        <p:txBody>
-          <a:bodyPr wrap="none" rtlCol="0">
-            <a:spAutoFit/>
-          </a:bodyPr>
-          <a:lstStyle/>
-          <a:p>
-            <a:r>
-              <a:rPr lang="en-US" sz="5400" dirty="0"/>
-              <a:t>3</a:t>
-            </a:r>
-          </a:p>
-        </p:txBody>
-      </p:sp>
-      <p:cxnSp>
-        <p:nvCxnSpPr>
-          <p:cNvPr id="6" name="Straight Connector 5">
-            <a:extLst>
-              <a:ext uri="{FF2B5EF4-FFF2-40B4-BE49-F238E27FC236}">
-                <a16:creationId xmlns:a16="http://schemas.microsoft.com/office/drawing/2014/main" id="{8C184E1D-CF59-4C96-8CCE-250D00DBE68C}"/>
-              </a:ext>
-            </a:extLst>
-          </p:cNvPr>
-          <p:cNvCxnSpPr>
-            <a:cxnSpLocks/>
-            <a:stCxn id="4" idx="2"/>
-          </p:cNvCxnSpPr>
-          <p:nvPr/>
-        </p:nvCxnSpPr>
-        <p:spPr>
-          <a:xfrm>
-            <a:off x="6096000" y="1771229"/>
-            <a:ext cx="0" cy="2875586"/>
-          </a:xfrm>
-          <a:prstGeom prst="line">
-            <a:avLst/>
-          </a:prstGeom>
-          <a:ln w="76200">
-            <a:solidFill>
-              <a:schemeClr val="tx1">
-                <a:lumMod val="50000"/>
-              </a:schemeClr>
-            </a:solidFill>
-          </a:ln>
-        </p:spPr>
-        <p:style>
-          <a:lnRef idx="1">
-            <a:schemeClr val="accent1"/>
-          </a:lnRef>
-          <a:fillRef idx="0">
-            <a:schemeClr val="accent1"/>
-          </a:fillRef>
-          <a:effectRef idx="0">
-            <a:schemeClr val="accent1"/>
-          </a:effectRef>
-          <a:fontRef idx="minor">
-            <a:schemeClr val="tx1"/>
-          </a:fontRef>
-        </p:style>
-      </p:cxnSp>
-      <p:sp>
-        <p:nvSpPr>
-          <p:cNvPr id="8" name="Oval 7">
-            <a:extLst>
-              <a:ext uri="{FF2B5EF4-FFF2-40B4-BE49-F238E27FC236}">
-                <a16:creationId xmlns:a16="http://schemas.microsoft.com/office/drawing/2014/main" id="{D780B0A6-9031-423A-8AC2-37C18347E369}"/>
-              </a:ext>
-            </a:extLst>
-          </p:cNvPr>
-          <p:cNvSpPr/>
-          <p:nvPr/>
-        </p:nvSpPr>
-        <p:spPr>
-          <a:xfrm>
-            <a:off x="5961613" y="2019994"/>
-            <a:ext cx="275706" cy="275706"/>
-          </a:xfrm>
-          <a:prstGeom prst="ellipse">
-            <a:avLst/>
-          </a:prstGeom>
-          <a:solidFill>
-            <a:schemeClr val="tx1">
-              <a:lumMod val="65000"/>
-            </a:schemeClr>
-          </a:solidFill>
-          <a:ln>
-            <a:solidFill>
-              <a:schemeClr val="tx1"/>
-            </a:solidFill>
-          </a:ln>
-        </p:spPr>
-        <p:style>
-          <a:lnRef idx="2">
-            <a:schemeClr val="accent1">
-              <a:shade val="50000"/>
-            </a:schemeClr>
-          </a:lnRef>
-          <a:fillRef idx="1">
-            <a:schemeClr val="accent1"/>
-          </a:fillRef>
-          <a:effectRef idx="0">
-            <a:schemeClr val="accent1"/>
-          </a:effectRef>
-          <a:fontRef idx="minor">
-            <a:schemeClr val="lt1"/>
-          </a:fontRef>
-        </p:style>
-        <p:txBody>
-          <a:bodyPr rtlCol="0" anchor="ctr"/>
-          <a:lstStyle/>
-          <a:p>
-            <a:pPr algn="ctr"/>
-            <a:endParaRPr lang="en-US"/>
-          </a:p>
-        </p:txBody>
-      </p:sp>
       <p:cxnSp>
         <p:nvCxnSpPr>
           <p:cNvPr id="10" name="Straight Arrow Connector 9">
@@ -3231,7 +3095,7 @@
         </p:nvCxnSpPr>
         <p:spPr>
           <a:xfrm flipH="1">
-            <a:off x="6650182" y="1246909"/>
+            <a:off x="7387754" y="4388042"/>
             <a:ext cx="1119594" cy="0"/>
           </a:xfrm>
           <a:prstGeom prst="straightConnector1">
@@ -3273,8 +3137,8 @@
         </p:nvSpPr>
         <p:spPr>
           <a:xfrm>
-            <a:off x="7769776" y="1062243"/>
-            <a:ext cx="2010487" cy="369332"/>
+            <a:off x="8507348" y="4203376"/>
+            <a:ext cx="3004349" cy="369332"/>
           </a:xfrm>
           <a:prstGeom prst="rect">
             <a:avLst/>
@@ -3289,15 +3153,128 @@
           <a:p>
             <a:r>
               <a:rPr lang="en-US" dirty="0"/>
-              <a:t>Odd number. Press F</a:t>
-            </a:r>
-          </a:p>
-        </p:txBody>
-      </p:sp>
+              <a:t>Face on bottom is angry. Press N</a:t>
+            </a:r>
+          </a:p>
+        </p:txBody>
+      </p:sp>
+      <p:grpSp>
+        <p:nvGrpSpPr>
+          <p:cNvPr id="2" name="Group 1">
+            <a:extLst>
+              <a:ext uri="{FF2B5EF4-FFF2-40B4-BE49-F238E27FC236}">
+                <a16:creationId xmlns:a16="http://schemas.microsoft.com/office/drawing/2014/main" id="{ACB9FE86-9FB8-45F2-8BFD-974151AB44A0}"/>
+              </a:ext>
+            </a:extLst>
+          </p:cNvPr>
+          <p:cNvGrpSpPr/>
+          <p:nvPr/>
+        </p:nvGrpSpPr>
+        <p:grpSpPr>
+          <a:xfrm>
+            <a:off x="4194889" y="780975"/>
+            <a:ext cx="2894783" cy="4601715"/>
+            <a:chOff x="4194889" y="780975"/>
+            <a:chExt cx="2894783" cy="4601715"/>
+          </a:xfrm>
+        </p:grpSpPr>
+        <p:sp>
+          <p:nvSpPr>
+            <p:cNvPr id="9" name="Rectangle 8">
+              <a:extLst>
+                <a:ext uri="{FF2B5EF4-FFF2-40B4-BE49-F238E27FC236}">
+                  <a16:creationId xmlns:a16="http://schemas.microsoft.com/office/drawing/2014/main" id="{E33E69C8-8389-4F64-B64F-B1BF66EA84FA}"/>
+                </a:ext>
+              </a:extLst>
+            </p:cNvPr>
+            <p:cNvSpPr/>
+            <p:nvPr/>
+          </p:nvSpPr>
+          <p:spPr>
+            <a:xfrm>
+              <a:off x="4194889" y="780975"/>
+              <a:ext cx="2894783" cy="4601715"/>
+            </a:xfrm>
+            <a:prstGeom prst="rect">
+              <a:avLst/>
+            </a:prstGeom>
+            <a:solidFill>
+              <a:schemeClr val="bg1"/>
+            </a:solidFill>
+            <a:ln w="38100">
+              <a:solidFill>
+                <a:schemeClr val="tx1"/>
+              </a:solidFill>
+            </a:ln>
+          </p:spPr>
+          <p:style>
+            <a:lnRef idx="2">
+              <a:schemeClr val="accent1">
+                <a:shade val="50000"/>
+              </a:schemeClr>
+            </a:lnRef>
+            <a:fillRef idx="1">
+              <a:schemeClr val="accent1"/>
+            </a:fillRef>
+            <a:effectRef idx="0">
+              <a:schemeClr val="accent1"/>
+            </a:effectRef>
+            <a:fontRef idx="minor">
+              <a:schemeClr val="lt1"/>
+            </a:fontRef>
+          </p:style>
+          <p:txBody>
+            <a:bodyPr rtlCol="0" anchor="ctr"/>
+            <a:lstStyle/>
+            <a:p>
+              <a:pPr algn="ctr"/>
+              <a:r>
+                <a:rPr lang="en-US" dirty="0"/>
+                <a:t>+</a:t>
+              </a:r>
+            </a:p>
+          </p:txBody>
+        </p:sp>
+        <p:pic>
+          <p:nvPicPr>
+            <p:cNvPr id="8" name="Picture 7">
+              <a:extLst>
+                <a:ext uri="{FF2B5EF4-FFF2-40B4-BE49-F238E27FC236}">
+                  <a16:creationId xmlns:a16="http://schemas.microsoft.com/office/drawing/2014/main" id="{E1B2793D-C755-4891-A8CB-6FFF134AAADA}"/>
+                </a:ext>
+              </a:extLst>
+            </p:cNvPr>
+            <p:cNvPicPr>
+              <a:picLocks noChangeAspect="1"/>
+            </p:cNvPicPr>
+            <p:nvPr/>
+          </p:nvPicPr>
+          <p:blipFill>
+            <a:blip r:embed="rId2">
+              <a:extLst>
+                <a:ext uri="{28A0092B-C50C-407E-A947-70E740481C1C}">
+                  <a14:useLocalDpi xmlns:a14="http://schemas.microsoft.com/office/drawing/2010/main" val="0"/>
+                </a:ext>
+              </a:extLst>
+            </a:blip>
+            <a:srcRect/>
+            <a:stretch/>
+          </p:blipFill>
+          <p:spPr>
+            <a:xfrm>
+              <a:off x="5067194" y="3538871"/>
+              <a:ext cx="1150172" cy="1557527"/>
+            </a:xfrm>
+            <a:prstGeom prst="rect">
+              <a:avLst/>
+            </a:prstGeom>
+          </p:spPr>
+        </p:pic>
+      </p:grpSp>
     </p:spTree>
     <p:extLst>
       <p:ext uri="{BB962C8B-B14F-4D97-AF65-F5344CB8AC3E}">
-        <p14:creationId xmlns:p14="http://schemas.microsoft.com/office/powerpoint/2010/main" val="1111390835"/>
+        <p14:creationId xmlns:p14="http://schemas.microsoft.com/office/powerpoint/2010/main" val="3353169746"/>
       </p:ext>
     </p:extLst>
   </p:cSld>
@@ -3308,1304 +3285,6 @@
 </file>
 
 <file path=ppt/slides/slide11.xml><?xml version="1.0" encoding="utf-8"?>
-<p:sld xmlns:a="http://schemas.openxmlformats.org/drawingml/2006/main" xmlns:r="http://schemas.openxmlformats.org/officeDocument/2006/relationships" xmlns:p="http://schemas.openxmlformats.org/presentationml/2006/main">
-  <p:cSld>
-    <p:spTree>
-      <p:nvGrpSpPr>
-        <p:cNvPr id="1" name=""/>
-        <p:cNvGrpSpPr/>
-        <p:nvPr/>
-      </p:nvGrpSpPr>
-      <p:grpSpPr>
-        <a:xfrm>
-          <a:off x="0" y="0"/>
-          <a:ext cx="0" cy="0"/>
-          <a:chOff x="0" y="0"/>
-          <a:chExt cx="0" cy="0"/>
-        </a:xfrm>
-      </p:grpSpPr>
-      <p:sp>
-        <p:nvSpPr>
-          <p:cNvPr id="4" name="TextBox 3">
-            <a:extLst>
-              <a:ext uri="{FF2B5EF4-FFF2-40B4-BE49-F238E27FC236}">
-                <a16:creationId xmlns:a16="http://schemas.microsoft.com/office/drawing/2014/main" id="{045EBAC0-D53D-4EA9-B71F-B4ABEF313ECB}"/>
-              </a:ext>
-            </a:extLst>
-          </p:cNvPr>
-          <p:cNvSpPr txBox="1"/>
-          <p:nvPr/>
-        </p:nvSpPr>
-        <p:spPr>
-          <a:xfrm>
-            <a:off x="5847374" y="847899"/>
-            <a:ext cx="497252" cy="923330"/>
-          </a:xfrm>
-          <a:prstGeom prst="rect">
-            <a:avLst/>
-          </a:prstGeom>
-          <a:noFill/>
-        </p:spPr>
-        <p:txBody>
-          <a:bodyPr wrap="none" rtlCol="0">
-            <a:spAutoFit/>
-          </a:bodyPr>
-          <a:lstStyle/>
-          <a:p>
-            <a:r>
-              <a:rPr lang="en-US" sz="5400" dirty="0"/>
-              <a:t>7</a:t>
-            </a:r>
-          </a:p>
-        </p:txBody>
-      </p:sp>
-      <p:cxnSp>
-        <p:nvCxnSpPr>
-          <p:cNvPr id="6" name="Straight Connector 5">
-            <a:extLst>
-              <a:ext uri="{FF2B5EF4-FFF2-40B4-BE49-F238E27FC236}">
-                <a16:creationId xmlns:a16="http://schemas.microsoft.com/office/drawing/2014/main" id="{8C184E1D-CF59-4C96-8CCE-250D00DBE68C}"/>
-              </a:ext>
-            </a:extLst>
-          </p:cNvPr>
-          <p:cNvCxnSpPr>
-            <a:cxnSpLocks/>
-            <a:stCxn id="4" idx="2"/>
-          </p:cNvCxnSpPr>
-          <p:nvPr/>
-        </p:nvCxnSpPr>
-        <p:spPr>
-          <a:xfrm>
-            <a:off x="6096000" y="1771229"/>
-            <a:ext cx="0" cy="2875586"/>
-          </a:xfrm>
-          <a:prstGeom prst="line">
-            <a:avLst/>
-          </a:prstGeom>
-          <a:ln w="76200">
-            <a:solidFill>
-              <a:schemeClr val="tx1">
-                <a:lumMod val="50000"/>
-              </a:schemeClr>
-            </a:solidFill>
-          </a:ln>
-        </p:spPr>
-        <p:style>
-          <a:lnRef idx="1">
-            <a:schemeClr val="accent1"/>
-          </a:lnRef>
-          <a:fillRef idx="0">
-            <a:schemeClr val="accent1"/>
-          </a:fillRef>
-          <a:effectRef idx="0">
-            <a:schemeClr val="accent1"/>
-          </a:effectRef>
-          <a:fontRef idx="minor">
-            <a:schemeClr val="tx1"/>
-          </a:fontRef>
-        </p:style>
-      </p:cxnSp>
-      <p:sp>
-        <p:nvSpPr>
-          <p:cNvPr id="8" name="Oval 7">
-            <a:extLst>
-              <a:ext uri="{FF2B5EF4-FFF2-40B4-BE49-F238E27FC236}">
-                <a16:creationId xmlns:a16="http://schemas.microsoft.com/office/drawing/2014/main" id="{D780B0A6-9031-423A-8AC2-37C18347E369}"/>
-              </a:ext>
-            </a:extLst>
-          </p:cNvPr>
-          <p:cNvSpPr/>
-          <p:nvPr/>
-        </p:nvSpPr>
-        <p:spPr>
-          <a:xfrm>
-            <a:off x="5961613" y="3772594"/>
-            <a:ext cx="275706" cy="275706"/>
-          </a:xfrm>
-          <a:prstGeom prst="ellipse">
-            <a:avLst/>
-          </a:prstGeom>
-          <a:solidFill>
-            <a:schemeClr val="tx1">
-              <a:lumMod val="65000"/>
-            </a:schemeClr>
-          </a:solidFill>
-          <a:ln>
-            <a:solidFill>
-              <a:schemeClr val="tx1"/>
-            </a:solidFill>
-          </a:ln>
-        </p:spPr>
-        <p:style>
-          <a:lnRef idx="2">
-            <a:schemeClr val="accent1">
-              <a:shade val="50000"/>
-            </a:schemeClr>
-          </a:lnRef>
-          <a:fillRef idx="1">
-            <a:schemeClr val="accent1"/>
-          </a:fillRef>
-          <a:effectRef idx="0">
-            <a:schemeClr val="accent1"/>
-          </a:effectRef>
-          <a:fontRef idx="minor">
-            <a:schemeClr val="lt1"/>
-          </a:fontRef>
-        </p:style>
-        <p:txBody>
-          <a:bodyPr rtlCol="0" anchor="ctr"/>
-          <a:lstStyle/>
-          <a:p>
-            <a:pPr algn="ctr"/>
-            <a:endParaRPr lang="en-US"/>
-          </a:p>
-        </p:txBody>
-      </p:sp>
-      <p:cxnSp>
-        <p:nvCxnSpPr>
-          <p:cNvPr id="10" name="Straight Arrow Connector 9">
-            <a:extLst>
-              <a:ext uri="{FF2B5EF4-FFF2-40B4-BE49-F238E27FC236}">
-                <a16:creationId xmlns:a16="http://schemas.microsoft.com/office/drawing/2014/main" id="{87A68CCB-8D05-4BD9-BDDE-EE29FEECE518}"/>
-              </a:ext>
-            </a:extLst>
-          </p:cNvPr>
-          <p:cNvCxnSpPr>
-            <a:cxnSpLocks/>
-            <a:stCxn id="11" idx="1"/>
-          </p:cNvCxnSpPr>
-          <p:nvPr/>
-        </p:nvCxnSpPr>
-        <p:spPr>
-          <a:xfrm flipH="1">
-            <a:off x="6650182" y="5056909"/>
-            <a:ext cx="1119594" cy="0"/>
-          </a:xfrm>
-          <a:prstGeom prst="straightConnector1">
-            <a:avLst/>
-          </a:prstGeom>
-          <a:ln w="57150">
-            <a:solidFill>
-              <a:srgbClr val="FFC000"/>
-            </a:solidFill>
-            <a:tailEnd type="triangle"/>
-          </a:ln>
-        </p:spPr>
-        <p:style>
-          <a:lnRef idx="1">
-            <a:schemeClr val="accent1"/>
-          </a:lnRef>
-          <a:fillRef idx="0">
-            <a:schemeClr val="accent1"/>
-          </a:fillRef>
-          <a:effectRef idx="0">
-            <a:schemeClr val="accent1"/>
-          </a:effectRef>
-          <a:fontRef idx="minor">
-            <a:schemeClr val="tx1"/>
-          </a:fontRef>
-        </p:style>
-      </p:cxnSp>
-      <p:sp>
-        <p:nvSpPr>
-          <p:cNvPr id="11" name="TextBox 10">
-            <a:extLst>
-              <a:ext uri="{FF2B5EF4-FFF2-40B4-BE49-F238E27FC236}">
-                <a16:creationId xmlns:a16="http://schemas.microsoft.com/office/drawing/2014/main" id="{345EDC75-7580-4EBA-A325-774C0DF7FACC}"/>
-              </a:ext>
-            </a:extLst>
-          </p:cNvPr>
-          <p:cNvSpPr txBox="1"/>
-          <p:nvPr/>
-        </p:nvSpPr>
-        <p:spPr>
-          <a:xfrm>
-            <a:off x="7769776" y="4872243"/>
-            <a:ext cx="1848583" cy="369332"/>
-          </a:xfrm>
-          <a:prstGeom prst="rect">
-            <a:avLst/>
-          </a:prstGeom>
-          <a:noFill/>
-        </p:spPr>
-        <p:txBody>
-          <a:bodyPr wrap="none" rtlCol="0">
-            <a:spAutoFit/>
-          </a:bodyPr>
-          <a:lstStyle/>
-          <a:p>
-            <a:r>
-              <a:rPr lang="en-US" dirty="0"/>
-              <a:t>Less than 5. Press F</a:t>
-            </a:r>
-          </a:p>
-        </p:txBody>
-      </p:sp>
-      <p:sp>
-        <p:nvSpPr>
-          <p:cNvPr id="7" name="TextBox 6">
-            <a:extLst>
-              <a:ext uri="{FF2B5EF4-FFF2-40B4-BE49-F238E27FC236}">
-                <a16:creationId xmlns:a16="http://schemas.microsoft.com/office/drawing/2014/main" id="{13381491-1677-4EE4-AFAE-DADB6416064E}"/>
-              </a:ext>
-            </a:extLst>
-          </p:cNvPr>
-          <p:cNvSpPr txBox="1"/>
-          <p:nvPr/>
-        </p:nvSpPr>
-        <p:spPr>
-          <a:xfrm>
-            <a:off x="5847374" y="4646815"/>
-            <a:ext cx="497252" cy="923330"/>
-          </a:xfrm>
-          <a:prstGeom prst="rect">
-            <a:avLst/>
-          </a:prstGeom>
-          <a:noFill/>
-        </p:spPr>
-        <p:txBody>
-          <a:bodyPr wrap="none" rtlCol="0">
-            <a:spAutoFit/>
-          </a:bodyPr>
-          <a:lstStyle/>
-          <a:p>
-            <a:r>
-              <a:rPr lang="en-US" sz="5400" dirty="0"/>
-              <a:t>3</a:t>
-            </a:r>
-          </a:p>
-        </p:txBody>
-      </p:sp>
-      <p:cxnSp>
-        <p:nvCxnSpPr>
-          <p:cNvPr id="9" name="Straight Arrow Connector 8">
-            <a:extLst>
-              <a:ext uri="{FF2B5EF4-FFF2-40B4-BE49-F238E27FC236}">
-                <a16:creationId xmlns:a16="http://schemas.microsoft.com/office/drawing/2014/main" id="{1535B23B-667E-46EB-B811-2ABC7CFCB5A7}"/>
-              </a:ext>
-            </a:extLst>
-          </p:cNvPr>
-          <p:cNvCxnSpPr>
-            <a:cxnSpLocks/>
-            <a:stCxn id="12" idx="1"/>
-          </p:cNvCxnSpPr>
-          <p:nvPr/>
-        </p:nvCxnSpPr>
-        <p:spPr>
-          <a:xfrm flipH="1">
-            <a:off x="6535882" y="3892209"/>
-            <a:ext cx="1119594" cy="0"/>
-          </a:xfrm>
-          <a:prstGeom prst="straightConnector1">
-            <a:avLst/>
-          </a:prstGeom>
-          <a:ln w="57150">
-            <a:solidFill>
-              <a:srgbClr val="FFC000"/>
-            </a:solidFill>
-            <a:tailEnd type="triangle"/>
-          </a:ln>
-        </p:spPr>
-        <p:style>
-          <a:lnRef idx="1">
-            <a:schemeClr val="accent1"/>
-          </a:lnRef>
-          <a:fillRef idx="0">
-            <a:schemeClr val="accent1"/>
-          </a:fillRef>
-          <a:effectRef idx="0">
-            <a:schemeClr val="accent1"/>
-          </a:effectRef>
-          <a:fontRef idx="minor">
-            <a:schemeClr val="tx1"/>
-          </a:fontRef>
-        </p:style>
-      </p:cxnSp>
-      <p:sp>
-        <p:nvSpPr>
-          <p:cNvPr id="12" name="TextBox 11">
-            <a:extLst>
-              <a:ext uri="{FF2B5EF4-FFF2-40B4-BE49-F238E27FC236}">
-                <a16:creationId xmlns:a16="http://schemas.microsoft.com/office/drawing/2014/main" id="{0282A9FE-C87A-4414-A276-329E8AF62300}"/>
-              </a:ext>
-            </a:extLst>
-          </p:cNvPr>
-          <p:cNvSpPr txBox="1"/>
-          <p:nvPr/>
-        </p:nvSpPr>
-        <p:spPr>
-          <a:xfrm>
-            <a:off x="7655476" y="3707543"/>
-            <a:ext cx="4188967" cy="369332"/>
-          </a:xfrm>
-          <a:prstGeom prst="rect">
-            <a:avLst/>
-          </a:prstGeom>
-          <a:noFill/>
-        </p:spPr>
-        <p:txBody>
-          <a:bodyPr wrap="none" rtlCol="0">
-            <a:spAutoFit/>
-          </a:bodyPr>
-          <a:lstStyle/>
-          <a:p>
-            <a:r>
-              <a:rPr lang="en-US" dirty="0"/>
-              <a:t>Circle is at bottom. Switch to more/less than 5.</a:t>
-            </a:r>
-          </a:p>
-        </p:txBody>
-      </p:sp>
-    </p:spTree>
-    <p:extLst>
-      <p:ext uri="{BB962C8B-B14F-4D97-AF65-F5344CB8AC3E}">
-        <p14:creationId xmlns:p14="http://schemas.microsoft.com/office/powerpoint/2010/main" val="2920996172"/>
-      </p:ext>
-    </p:extLst>
-  </p:cSld>
-  <p:clrMapOvr>
-    <a:masterClrMapping/>
-  </p:clrMapOvr>
-</p:sld>
-</file>
-
-<file path=ppt/slides/slide12.xml><?xml version="1.0" encoding="utf-8"?>
-<p:sld xmlns:a="http://schemas.openxmlformats.org/drawingml/2006/main" xmlns:r="http://schemas.openxmlformats.org/officeDocument/2006/relationships" xmlns:p="http://schemas.openxmlformats.org/presentationml/2006/main">
-  <p:cSld>
-    <p:spTree>
-      <p:nvGrpSpPr>
-        <p:cNvPr id="1" name=""/>
-        <p:cNvGrpSpPr/>
-        <p:nvPr/>
-      </p:nvGrpSpPr>
-      <p:grpSpPr>
-        <a:xfrm>
-          <a:off x="0" y="0"/>
-          <a:ext cx="0" cy="0"/>
-          <a:chOff x="0" y="0"/>
-          <a:chExt cx="0" cy="0"/>
-        </a:xfrm>
-      </p:grpSpPr>
-      <p:sp>
-        <p:nvSpPr>
-          <p:cNvPr id="4" name="TextBox 3">
-            <a:extLst>
-              <a:ext uri="{FF2B5EF4-FFF2-40B4-BE49-F238E27FC236}">
-                <a16:creationId xmlns:a16="http://schemas.microsoft.com/office/drawing/2014/main" id="{045EBAC0-D53D-4EA9-B71F-B4ABEF313ECB}"/>
-              </a:ext>
-            </a:extLst>
-          </p:cNvPr>
-          <p:cNvSpPr txBox="1"/>
-          <p:nvPr/>
-        </p:nvSpPr>
-        <p:spPr>
-          <a:xfrm>
-            <a:off x="5847374" y="847899"/>
-            <a:ext cx="497252" cy="923330"/>
-          </a:xfrm>
-          <a:prstGeom prst="rect">
-            <a:avLst/>
-          </a:prstGeom>
-          <a:noFill/>
-        </p:spPr>
-        <p:txBody>
-          <a:bodyPr wrap="none" rtlCol="0">
-            <a:spAutoFit/>
-          </a:bodyPr>
-          <a:lstStyle/>
-          <a:p>
-            <a:r>
-              <a:rPr lang="en-US" sz="5400" dirty="0"/>
-              <a:t>6</a:t>
-            </a:r>
-          </a:p>
-        </p:txBody>
-      </p:sp>
-      <p:cxnSp>
-        <p:nvCxnSpPr>
-          <p:cNvPr id="6" name="Straight Connector 5">
-            <a:extLst>
-              <a:ext uri="{FF2B5EF4-FFF2-40B4-BE49-F238E27FC236}">
-                <a16:creationId xmlns:a16="http://schemas.microsoft.com/office/drawing/2014/main" id="{8C184E1D-CF59-4C96-8CCE-250D00DBE68C}"/>
-              </a:ext>
-            </a:extLst>
-          </p:cNvPr>
-          <p:cNvCxnSpPr>
-            <a:cxnSpLocks/>
-            <a:stCxn id="4" idx="2"/>
-          </p:cNvCxnSpPr>
-          <p:nvPr/>
-        </p:nvCxnSpPr>
-        <p:spPr>
-          <a:xfrm>
-            <a:off x="6096000" y="1771229"/>
-            <a:ext cx="0" cy="2875586"/>
-          </a:xfrm>
-          <a:prstGeom prst="line">
-            <a:avLst/>
-          </a:prstGeom>
-          <a:ln w="76200">
-            <a:solidFill>
-              <a:schemeClr val="tx1">
-                <a:lumMod val="50000"/>
-              </a:schemeClr>
-            </a:solidFill>
-          </a:ln>
-        </p:spPr>
-        <p:style>
-          <a:lnRef idx="1">
-            <a:schemeClr val="accent1"/>
-          </a:lnRef>
-          <a:fillRef idx="0">
-            <a:schemeClr val="accent1"/>
-          </a:fillRef>
-          <a:effectRef idx="0">
-            <a:schemeClr val="accent1"/>
-          </a:effectRef>
-          <a:fontRef idx="minor">
-            <a:schemeClr val="tx1"/>
-          </a:fontRef>
-        </p:style>
-      </p:cxnSp>
-      <p:sp>
-        <p:nvSpPr>
-          <p:cNvPr id="8" name="Oval 7">
-            <a:extLst>
-              <a:ext uri="{FF2B5EF4-FFF2-40B4-BE49-F238E27FC236}">
-                <a16:creationId xmlns:a16="http://schemas.microsoft.com/office/drawing/2014/main" id="{D780B0A6-9031-423A-8AC2-37C18347E369}"/>
-              </a:ext>
-            </a:extLst>
-          </p:cNvPr>
-          <p:cNvSpPr/>
-          <p:nvPr/>
-        </p:nvSpPr>
-        <p:spPr>
-          <a:xfrm>
-            <a:off x="5961613" y="2019994"/>
-            <a:ext cx="275706" cy="275706"/>
-          </a:xfrm>
-          <a:prstGeom prst="ellipse">
-            <a:avLst/>
-          </a:prstGeom>
-          <a:solidFill>
-            <a:schemeClr val="tx1">
-              <a:lumMod val="65000"/>
-            </a:schemeClr>
-          </a:solidFill>
-          <a:ln>
-            <a:solidFill>
-              <a:schemeClr val="tx1"/>
-            </a:solidFill>
-          </a:ln>
-        </p:spPr>
-        <p:style>
-          <a:lnRef idx="2">
-            <a:schemeClr val="accent1">
-              <a:shade val="50000"/>
-            </a:schemeClr>
-          </a:lnRef>
-          <a:fillRef idx="1">
-            <a:schemeClr val="accent1"/>
-          </a:fillRef>
-          <a:effectRef idx="0">
-            <a:schemeClr val="accent1"/>
-          </a:effectRef>
-          <a:fontRef idx="minor">
-            <a:schemeClr val="lt1"/>
-          </a:fontRef>
-        </p:style>
-        <p:txBody>
-          <a:bodyPr rtlCol="0" anchor="ctr"/>
-          <a:lstStyle/>
-          <a:p>
-            <a:pPr algn="ctr"/>
-            <a:endParaRPr lang="en-US"/>
-          </a:p>
-        </p:txBody>
-      </p:sp>
-      <p:cxnSp>
-        <p:nvCxnSpPr>
-          <p:cNvPr id="10" name="Straight Arrow Connector 9">
-            <a:extLst>
-              <a:ext uri="{FF2B5EF4-FFF2-40B4-BE49-F238E27FC236}">
-                <a16:creationId xmlns:a16="http://schemas.microsoft.com/office/drawing/2014/main" id="{87A68CCB-8D05-4BD9-BDDE-EE29FEECE518}"/>
-              </a:ext>
-            </a:extLst>
-          </p:cNvPr>
-          <p:cNvCxnSpPr>
-            <a:cxnSpLocks/>
-            <a:stCxn id="11" idx="1"/>
-          </p:cNvCxnSpPr>
-          <p:nvPr/>
-        </p:nvCxnSpPr>
-        <p:spPr>
-          <a:xfrm flipH="1">
-            <a:off x="6650182" y="1246909"/>
-            <a:ext cx="1119594" cy="0"/>
-          </a:xfrm>
-          <a:prstGeom prst="straightConnector1">
-            <a:avLst/>
-          </a:prstGeom>
-          <a:ln w="57150">
-            <a:solidFill>
-              <a:srgbClr val="FFC000"/>
-            </a:solidFill>
-            <a:tailEnd type="triangle"/>
-          </a:ln>
-        </p:spPr>
-        <p:style>
-          <a:lnRef idx="1">
-            <a:schemeClr val="accent1"/>
-          </a:lnRef>
-          <a:fillRef idx="0">
-            <a:schemeClr val="accent1"/>
-          </a:fillRef>
-          <a:effectRef idx="0">
-            <a:schemeClr val="accent1"/>
-          </a:effectRef>
-          <a:fontRef idx="minor">
-            <a:schemeClr val="tx1"/>
-          </a:fontRef>
-        </p:style>
-      </p:cxnSp>
-      <p:sp>
-        <p:nvSpPr>
-          <p:cNvPr id="11" name="TextBox 10">
-            <a:extLst>
-              <a:ext uri="{FF2B5EF4-FFF2-40B4-BE49-F238E27FC236}">
-                <a16:creationId xmlns:a16="http://schemas.microsoft.com/office/drawing/2014/main" id="{345EDC75-7580-4EBA-A325-774C0DF7FACC}"/>
-              </a:ext>
-            </a:extLst>
-          </p:cNvPr>
-          <p:cNvSpPr txBox="1"/>
-          <p:nvPr/>
-        </p:nvSpPr>
-        <p:spPr>
-          <a:xfrm>
-            <a:off x="7769776" y="1062243"/>
-            <a:ext cx="2055371" cy="369332"/>
-          </a:xfrm>
-          <a:prstGeom prst="rect">
-            <a:avLst/>
-          </a:prstGeom>
-          <a:noFill/>
-        </p:spPr>
-        <p:txBody>
-          <a:bodyPr wrap="none" rtlCol="0">
-            <a:spAutoFit/>
-          </a:bodyPr>
-          <a:lstStyle/>
-          <a:p>
-            <a:r>
-              <a:rPr lang="en-US" dirty="0"/>
-              <a:t>Even number. Press J</a:t>
-            </a:r>
-          </a:p>
-        </p:txBody>
-      </p:sp>
-      <p:cxnSp>
-        <p:nvCxnSpPr>
-          <p:cNvPr id="9" name="Straight Arrow Connector 8">
-            <a:extLst>
-              <a:ext uri="{FF2B5EF4-FFF2-40B4-BE49-F238E27FC236}">
-                <a16:creationId xmlns:a16="http://schemas.microsoft.com/office/drawing/2014/main" id="{6E091362-C2EB-4614-8A38-C71880B75EBB}"/>
-              </a:ext>
-            </a:extLst>
-          </p:cNvPr>
-          <p:cNvCxnSpPr>
-            <a:cxnSpLocks/>
-            <a:stCxn id="12" idx="1"/>
-          </p:cNvCxnSpPr>
-          <p:nvPr/>
-        </p:nvCxnSpPr>
-        <p:spPr>
-          <a:xfrm flipH="1">
-            <a:off x="6573982" y="2204660"/>
-            <a:ext cx="1119594" cy="0"/>
-          </a:xfrm>
-          <a:prstGeom prst="straightConnector1">
-            <a:avLst/>
-          </a:prstGeom>
-          <a:ln w="57150">
-            <a:solidFill>
-              <a:srgbClr val="FFC000"/>
-            </a:solidFill>
-            <a:tailEnd type="triangle"/>
-          </a:ln>
-        </p:spPr>
-        <p:style>
-          <a:lnRef idx="1">
-            <a:schemeClr val="accent1"/>
-          </a:lnRef>
-          <a:fillRef idx="0">
-            <a:schemeClr val="accent1"/>
-          </a:fillRef>
-          <a:effectRef idx="0">
-            <a:schemeClr val="accent1"/>
-          </a:effectRef>
-          <a:fontRef idx="minor">
-            <a:schemeClr val="tx1"/>
-          </a:fontRef>
-        </p:style>
-      </p:cxnSp>
-      <p:sp>
-        <p:nvSpPr>
-          <p:cNvPr id="12" name="TextBox 11">
-            <a:extLst>
-              <a:ext uri="{FF2B5EF4-FFF2-40B4-BE49-F238E27FC236}">
-                <a16:creationId xmlns:a16="http://schemas.microsoft.com/office/drawing/2014/main" id="{0BFD370F-64FE-4F72-8A44-0037404EEDC2}"/>
-              </a:ext>
-            </a:extLst>
-          </p:cNvPr>
-          <p:cNvSpPr txBox="1"/>
-          <p:nvPr/>
-        </p:nvSpPr>
-        <p:spPr>
-          <a:xfrm>
-            <a:off x="7693576" y="2019994"/>
-            <a:ext cx="2690160" cy="369332"/>
-          </a:xfrm>
-          <a:prstGeom prst="rect">
-            <a:avLst/>
-          </a:prstGeom>
-          <a:noFill/>
-        </p:spPr>
-        <p:txBody>
-          <a:bodyPr wrap="none" rtlCol="0">
-            <a:spAutoFit/>
-          </a:bodyPr>
-          <a:lstStyle/>
-          <a:p>
-            <a:r>
-              <a:rPr lang="en-US" dirty="0"/>
-              <a:t>Circle is at top. Do odd/even.</a:t>
-            </a:r>
-          </a:p>
-        </p:txBody>
-      </p:sp>
-    </p:spTree>
-    <p:extLst>
-      <p:ext uri="{BB962C8B-B14F-4D97-AF65-F5344CB8AC3E}">
-        <p14:creationId xmlns:p14="http://schemas.microsoft.com/office/powerpoint/2010/main" val="287124235"/>
-      </p:ext>
-    </p:extLst>
-  </p:cSld>
-  <p:clrMapOvr>
-    <a:masterClrMapping/>
-  </p:clrMapOvr>
-</p:sld>
-</file>
-
-<file path=ppt/slides/slide13.xml><?xml version="1.0" encoding="utf-8"?>
-<p:sld xmlns:a="http://schemas.openxmlformats.org/drawingml/2006/main" xmlns:r="http://schemas.openxmlformats.org/officeDocument/2006/relationships" xmlns:p="http://schemas.openxmlformats.org/presentationml/2006/main">
-  <p:cSld>
-    <p:spTree>
-      <p:nvGrpSpPr>
-        <p:cNvPr id="1" name=""/>
-        <p:cNvGrpSpPr/>
-        <p:nvPr/>
-      </p:nvGrpSpPr>
-      <p:grpSpPr>
-        <a:xfrm>
-          <a:off x="0" y="0"/>
-          <a:ext cx="0" cy="0"/>
-          <a:chOff x="0" y="0"/>
-          <a:chExt cx="0" cy="0"/>
-        </a:xfrm>
-      </p:grpSpPr>
-      <p:sp>
-        <p:nvSpPr>
-          <p:cNvPr id="4" name="TextBox 3">
-            <a:extLst>
-              <a:ext uri="{FF2B5EF4-FFF2-40B4-BE49-F238E27FC236}">
-                <a16:creationId xmlns:a16="http://schemas.microsoft.com/office/drawing/2014/main" id="{045EBAC0-D53D-4EA9-B71F-B4ABEF313ECB}"/>
-              </a:ext>
-            </a:extLst>
-          </p:cNvPr>
-          <p:cNvSpPr txBox="1"/>
-          <p:nvPr/>
-        </p:nvSpPr>
-        <p:spPr>
-          <a:xfrm>
-            <a:off x="5847374" y="847899"/>
-            <a:ext cx="497252" cy="923330"/>
-          </a:xfrm>
-          <a:prstGeom prst="rect">
-            <a:avLst/>
-          </a:prstGeom>
-          <a:noFill/>
-        </p:spPr>
-        <p:txBody>
-          <a:bodyPr wrap="none" rtlCol="0">
-            <a:spAutoFit/>
-          </a:bodyPr>
-          <a:lstStyle/>
-          <a:p>
-            <a:r>
-              <a:rPr lang="en-US" sz="5400" dirty="0"/>
-              <a:t>4</a:t>
-            </a:r>
-          </a:p>
-        </p:txBody>
-      </p:sp>
-      <p:cxnSp>
-        <p:nvCxnSpPr>
-          <p:cNvPr id="6" name="Straight Connector 5">
-            <a:extLst>
-              <a:ext uri="{FF2B5EF4-FFF2-40B4-BE49-F238E27FC236}">
-                <a16:creationId xmlns:a16="http://schemas.microsoft.com/office/drawing/2014/main" id="{8C184E1D-CF59-4C96-8CCE-250D00DBE68C}"/>
-              </a:ext>
-            </a:extLst>
-          </p:cNvPr>
-          <p:cNvCxnSpPr>
-            <a:cxnSpLocks/>
-            <a:stCxn id="4" idx="2"/>
-          </p:cNvCxnSpPr>
-          <p:nvPr/>
-        </p:nvCxnSpPr>
-        <p:spPr>
-          <a:xfrm>
-            <a:off x="6096000" y="1771229"/>
-            <a:ext cx="0" cy="2875586"/>
-          </a:xfrm>
-          <a:prstGeom prst="line">
-            <a:avLst/>
-          </a:prstGeom>
-          <a:ln w="76200">
-            <a:solidFill>
-              <a:schemeClr val="tx1">
-                <a:lumMod val="50000"/>
-              </a:schemeClr>
-            </a:solidFill>
-          </a:ln>
-        </p:spPr>
-        <p:style>
-          <a:lnRef idx="1">
-            <a:schemeClr val="accent1"/>
-          </a:lnRef>
-          <a:fillRef idx="0">
-            <a:schemeClr val="accent1"/>
-          </a:fillRef>
-          <a:effectRef idx="0">
-            <a:schemeClr val="accent1"/>
-          </a:effectRef>
-          <a:fontRef idx="minor">
-            <a:schemeClr val="tx1"/>
-          </a:fontRef>
-        </p:style>
-      </p:cxnSp>
-      <p:sp>
-        <p:nvSpPr>
-          <p:cNvPr id="8" name="Oval 7">
-            <a:extLst>
-              <a:ext uri="{FF2B5EF4-FFF2-40B4-BE49-F238E27FC236}">
-                <a16:creationId xmlns:a16="http://schemas.microsoft.com/office/drawing/2014/main" id="{D780B0A6-9031-423A-8AC2-37C18347E369}"/>
-              </a:ext>
-            </a:extLst>
-          </p:cNvPr>
-          <p:cNvSpPr/>
-          <p:nvPr/>
-        </p:nvSpPr>
-        <p:spPr>
-          <a:xfrm>
-            <a:off x="5961613" y="2019994"/>
-            <a:ext cx="275706" cy="275706"/>
-          </a:xfrm>
-          <a:prstGeom prst="ellipse">
-            <a:avLst/>
-          </a:prstGeom>
-          <a:solidFill>
-            <a:schemeClr val="tx1">
-              <a:lumMod val="65000"/>
-            </a:schemeClr>
-          </a:solidFill>
-          <a:ln>
-            <a:solidFill>
-              <a:schemeClr val="tx1"/>
-            </a:solidFill>
-          </a:ln>
-        </p:spPr>
-        <p:style>
-          <a:lnRef idx="2">
-            <a:schemeClr val="accent1">
-              <a:shade val="50000"/>
-            </a:schemeClr>
-          </a:lnRef>
-          <a:fillRef idx="1">
-            <a:schemeClr val="accent1"/>
-          </a:fillRef>
-          <a:effectRef idx="0">
-            <a:schemeClr val="accent1"/>
-          </a:effectRef>
-          <a:fontRef idx="minor">
-            <a:schemeClr val="lt1"/>
-          </a:fontRef>
-        </p:style>
-        <p:txBody>
-          <a:bodyPr rtlCol="0" anchor="ctr"/>
-          <a:lstStyle/>
-          <a:p>
-            <a:pPr algn="ctr"/>
-            <a:endParaRPr lang="en-US"/>
-          </a:p>
-        </p:txBody>
-      </p:sp>
-      <p:cxnSp>
-        <p:nvCxnSpPr>
-          <p:cNvPr id="10" name="Straight Arrow Connector 9">
-            <a:extLst>
-              <a:ext uri="{FF2B5EF4-FFF2-40B4-BE49-F238E27FC236}">
-                <a16:creationId xmlns:a16="http://schemas.microsoft.com/office/drawing/2014/main" id="{87A68CCB-8D05-4BD9-BDDE-EE29FEECE518}"/>
-              </a:ext>
-            </a:extLst>
-          </p:cNvPr>
-          <p:cNvCxnSpPr>
-            <a:cxnSpLocks/>
-            <a:stCxn id="11" idx="1"/>
-          </p:cNvCxnSpPr>
-          <p:nvPr/>
-        </p:nvCxnSpPr>
-        <p:spPr>
-          <a:xfrm flipH="1">
-            <a:off x="6650182" y="1246909"/>
-            <a:ext cx="1119594" cy="0"/>
-          </a:xfrm>
-          <a:prstGeom prst="straightConnector1">
-            <a:avLst/>
-          </a:prstGeom>
-          <a:ln w="57150">
-            <a:solidFill>
-              <a:srgbClr val="FFC000"/>
-            </a:solidFill>
-            <a:tailEnd type="triangle"/>
-          </a:ln>
-        </p:spPr>
-        <p:style>
-          <a:lnRef idx="1">
-            <a:schemeClr val="accent1"/>
-          </a:lnRef>
-          <a:fillRef idx="0">
-            <a:schemeClr val="accent1"/>
-          </a:fillRef>
-          <a:effectRef idx="0">
-            <a:schemeClr val="accent1"/>
-          </a:effectRef>
-          <a:fontRef idx="minor">
-            <a:schemeClr val="tx1"/>
-          </a:fontRef>
-        </p:style>
-      </p:cxnSp>
-      <p:sp>
-        <p:nvSpPr>
-          <p:cNvPr id="11" name="TextBox 10">
-            <a:extLst>
-              <a:ext uri="{FF2B5EF4-FFF2-40B4-BE49-F238E27FC236}">
-                <a16:creationId xmlns:a16="http://schemas.microsoft.com/office/drawing/2014/main" id="{345EDC75-7580-4EBA-A325-774C0DF7FACC}"/>
-              </a:ext>
-            </a:extLst>
-          </p:cNvPr>
-          <p:cNvSpPr txBox="1"/>
-          <p:nvPr/>
-        </p:nvSpPr>
-        <p:spPr>
-          <a:xfrm>
-            <a:off x="7769776" y="1062243"/>
-            <a:ext cx="2055371" cy="369332"/>
-          </a:xfrm>
-          <a:prstGeom prst="rect">
-            <a:avLst/>
-          </a:prstGeom>
-          <a:noFill/>
-        </p:spPr>
-        <p:txBody>
-          <a:bodyPr wrap="none" rtlCol="0">
-            <a:spAutoFit/>
-          </a:bodyPr>
-          <a:lstStyle/>
-          <a:p>
-            <a:r>
-              <a:rPr lang="en-US" dirty="0"/>
-              <a:t>Even number. Press J</a:t>
-            </a:r>
-          </a:p>
-        </p:txBody>
-      </p:sp>
-    </p:spTree>
-    <p:extLst>
-      <p:ext uri="{BB962C8B-B14F-4D97-AF65-F5344CB8AC3E}">
-        <p14:creationId xmlns:p14="http://schemas.microsoft.com/office/powerpoint/2010/main" val="2292552248"/>
-      </p:ext>
-    </p:extLst>
-  </p:cSld>
-  <p:clrMapOvr>
-    <a:masterClrMapping/>
-  </p:clrMapOvr>
-</p:sld>
-</file>
-
-<file path=ppt/slides/slide14.xml><?xml version="1.0" encoding="utf-8"?>
-<p:sld xmlns:a="http://schemas.openxmlformats.org/drawingml/2006/main" xmlns:r="http://schemas.openxmlformats.org/officeDocument/2006/relationships" xmlns:p="http://schemas.openxmlformats.org/presentationml/2006/main">
-  <p:cSld>
-    <p:spTree>
-      <p:nvGrpSpPr>
-        <p:cNvPr id="1" name=""/>
-        <p:cNvGrpSpPr/>
-        <p:nvPr/>
-      </p:nvGrpSpPr>
-      <p:grpSpPr>
-        <a:xfrm>
-          <a:off x="0" y="0"/>
-          <a:ext cx="0" cy="0"/>
-          <a:chOff x="0" y="0"/>
-          <a:chExt cx="0" cy="0"/>
-        </a:xfrm>
-      </p:grpSpPr>
-      <p:sp>
-        <p:nvSpPr>
-          <p:cNvPr id="4" name="TextBox 3">
-            <a:extLst>
-              <a:ext uri="{FF2B5EF4-FFF2-40B4-BE49-F238E27FC236}">
-                <a16:creationId xmlns:a16="http://schemas.microsoft.com/office/drawing/2014/main" id="{045EBAC0-D53D-4EA9-B71F-B4ABEF313ECB}"/>
-              </a:ext>
-            </a:extLst>
-          </p:cNvPr>
-          <p:cNvSpPr txBox="1"/>
-          <p:nvPr/>
-        </p:nvSpPr>
-        <p:spPr>
-          <a:xfrm>
-            <a:off x="5847374" y="847899"/>
-            <a:ext cx="497252" cy="923330"/>
-          </a:xfrm>
-          <a:prstGeom prst="rect">
-            <a:avLst/>
-          </a:prstGeom>
-          <a:noFill/>
-        </p:spPr>
-        <p:txBody>
-          <a:bodyPr wrap="none" rtlCol="0">
-            <a:spAutoFit/>
-          </a:bodyPr>
-          <a:lstStyle/>
-          <a:p>
-            <a:r>
-              <a:rPr lang="en-US" sz="5400" dirty="0"/>
-              <a:t>2</a:t>
-            </a:r>
-          </a:p>
-        </p:txBody>
-      </p:sp>
-      <p:cxnSp>
-        <p:nvCxnSpPr>
-          <p:cNvPr id="6" name="Straight Connector 5">
-            <a:extLst>
-              <a:ext uri="{FF2B5EF4-FFF2-40B4-BE49-F238E27FC236}">
-                <a16:creationId xmlns:a16="http://schemas.microsoft.com/office/drawing/2014/main" id="{8C184E1D-CF59-4C96-8CCE-250D00DBE68C}"/>
-              </a:ext>
-            </a:extLst>
-          </p:cNvPr>
-          <p:cNvCxnSpPr>
-            <a:cxnSpLocks/>
-            <a:stCxn id="4" idx="2"/>
-          </p:cNvCxnSpPr>
-          <p:nvPr/>
-        </p:nvCxnSpPr>
-        <p:spPr>
-          <a:xfrm>
-            <a:off x="6096000" y="1771229"/>
-            <a:ext cx="0" cy="2875586"/>
-          </a:xfrm>
-          <a:prstGeom prst="line">
-            <a:avLst/>
-          </a:prstGeom>
-          <a:ln w="76200">
-            <a:solidFill>
-              <a:schemeClr val="tx1">
-                <a:lumMod val="50000"/>
-              </a:schemeClr>
-            </a:solidFill>
-          </a:ln>
-        </p:spPr>
-        <p:style>
-          <a:lnRef idx="1">
-            <a:schemeClr val="accent1"/>
-          </a:lnRef>
-          <a:fillRef idx="0">
-            <a:schemeClr val="accent1"/>
-          </a:fillRef>
-          <a:effectRef idx="0">
-            <a:schemeClr val="accent1"/>
-          </a:effectRef>
-          <a:fontRef idx="minor">
-            <a:schemeClr val="tx1"/>
-          </a:fontRef>
-        </p:style>
-      </p:cxnSp>
-      <p:sp>
-        <p:nvSpPr>
-          <p:cNvPr id="8" name="Oval 7">
-            <a:extLst>
-              <a:ext uri="{FF2B5EF4-FFF2-40B4-BE49-F238E27FC236}">
-                <a16:creationId xmlns:a16="http://schemas.microsoft.com/office/drawing/2014/main" id="{D780B0A6-9031-423A-8AC2-37C18347E369}"/>
-              </a:ext>
-            </a:extLst>
-          </p:cNvPr>
-          <p:cNvSpPr/>
-          <p:nvPr/>
-        </p:nvSpPr>
-        <p:spPr>
-          <a:xfrm>
-            <a:off x="5961613" y="3772594"/>
-            <a:ext cx="275706" cy="275706"/>
-          </a:xfrm>
-          <a:prstGeom prst="ellipse">
-            <a:avLst/>
-          </a:prstGeom>
-          <a:solidFill>
-            <a:schemeClr val="tx1">
-              <a:lumMod val="65000"/>
-            </a:schemeClr>
-          </a:solidFill>
-          <a:ln>
-            <a:solidFill>
-              <a:schemeClr val="tx1"/>
-            </a:solidFill>
-          </a:ln>
-        </p:spPr>
-        <p:style>
-          <a:lnRef idx="2">
-            <a:schemeClr val="accent1">
-              <a:shade val="50000"/>
-            </a:schemeClr>
-          </a:lnRef>
-          <a:fillRef idx="1">
-            <a:schemeClr val="accent1"/>
-          </a:fillRef>
-          <a:effectRef idx="0">
-            <a:schemeClr val="accent1"/>
-          </a:effectRef>
-          <a:fontRef idx="minor">
-            <a:schemeClr val="lt1"/>
-          </a:fontRef>
-        </p:style>
-        <p:txBody>
-          <a:bodyPr rtlCol="0" anchor="ctr"/>
-          <a:lstStyle/>
-          <a:p>
-            <a:pPr algn="ctr"/>
-            <a:endParaRPr lang="en-US"/>
-          </a:p>
-        </p:txBody>
-      </p:sp>
-      <p:cxnSp>
-        <p:nvCxnSpPr>
-          <p:cNvPr id="10" name="Straight Arrow Connector 9">
-            <a:extLst>
-              <a:ext uri="{FF2B5EF4-FFF2-40B4-BE49-F238E27FC236}">
-                <a16:creationId xmlns:a16="http://schemas.microsoft.com/office/drawing/2014/main" id="{87A68CCB-8D05-4BD9-BDDE-EE29FEECE518}"/>
-              </a:ext>
-            </a:extLst>
-          </p:cNvPr>
-          <p:cNvCxnSpPr>
-            <a:cxnSpLocks/>
-            <a:stCxn id="11" idx="1"/>
-          </p:cNvCxnSpPr>
-          <p:nvPr/>
-        </p:nvCxnSpPr>
-        <p:spPr>
-          <a:xfrm flipH="1">
-            <a:off x="6650182" y="5056909"/>
-            <a:ext cx="1119594" cy="0"/>
-          </a:xfrm>
-          <a:prstGeom prst="straightConnector1">
-            <a:avLst/>
-          </a:prstGeom>
-          <a:ln w="57150">
-            <a:solidFill>
-              <a:srgbClr val="FFC000"/>
-            </a:solidFill>
-            <a:tailEnd type="triangle"/>
-          </a:ln>
-        </p:spPr>
-        <p:style>
-          <a:lnRef idx="1">
-            <a:schemeClr val="accent1"/>
-          </a:lnRef>
-          <a:fillRef idx="0">
-            <a:schemeClr val="accent1"/>
-          </a:fillRef>
-          <a:effectRef idx="0">
-            <a:schemeClr val="accent1"/>
-          </a:effectRef>
-          <a:fontRef idx="minor">
-            <a:schemeClr val="tx1"/>
-          </a:fontRef>
-        </p:style>
-      </p:cxnSp>
-      <p:sp>
-        <p:nvSpPr>
-          <p:cNvPr id="11" name="TextBox 10">
-            <a:extLst>
-              <a:ext uri="{FF2B5EF4-FFF2-40B4-BE49-F238E27FC236}">
-                <a16:creationId xmlns:a16="http://schemas.microsoft.com/office/drawing/2014/main" id="{345EDC75-7580-4EBA-A325-774C0DF7FACC}"/>
-              </a:ext>
-            </a:extLst>
-          </p:cNvPr>
-          <p:cNvSpPr txBox="1"/>
-          <p:nvPr/>
-        </p:nvSpPr>
-        <p:spPr>
-          <a:xfrm>
-            <a:off x="7769776" y="4872243"/>
-            <a:ext cx="1951175" cy="369332"/>
-          </a:xfrm>
-          <a:prstGeom prst="rect">
-            <a:avLst/>
-          </a:prstGeom>
-          <a:noFill/>
-        </p:spPr>
-        <p:txBody>
-          <a:bodyPr wrap="none" rtlCol="0">
-            <a:spAutoFit/>
-          </a:bodyPr>
-          <a:lstStyle/>
-          <a:p>
-            <a:r>
-              <a:rPr lang="en-US" dirty="0"/>
-              <a:t>More than 5. Press J</a:t>
-            </a:r>
-          </a:p>
-        </p:txBody>
-      </p:sp>
-      <p:sp>
-        <p:nvSpPr>
-          <p:cNvPr id="7" name="TextBox 6">
-            <a:extLst>
-              <a:ext uri="{FF2B5EF4-FFF2-40B4-BE49-F238E27FC236}">
-                <a16:creationId xmlns:a16="http://schemas.microsoft.com/office/drawing/2014/main" id="{13381491-1677-4EE4-AFAE-DADB6416064E}"/>
-              </a:ext>
-            </a:extLst>
-          </p:cNvPr>
-          <p:cNvSpPr txBox="1"/>
-          <p:nvPr/>
-        </p:nvSpPr>
-        <p:spPr>
-          <a:xfrm>
-            <a:off x="5847374" y="4646815"/>
-            <a:ext cx="497252" cy="923330"/>
-          </a:xfrm>
-          <a:prstGeom prst="rect">
-            <a:avLst/>
-          </a:prstGeom>
-          <a:noFill/>
-        </p:spPr>
-        <p:txBody>
-          <a:bodyPr wrap="none" rtlCol="0">
-            <a:spAutoFit/>
-          </a:bodyPr>
-          <a:lstStyle/>
-          <a:p>
-            <a:r>
-              <a:rPr lang="en-US" sz="5400" dirty="0"/>
-              <a:t>8</a:t>
-            </a:r>
-          </a:p>
-        </p:txBody>
-      </p:sp>
-      <p:cxnSp>
-        <p:nvCxnSpPr>
-          <p:cNvPr id="9" name="Straight Arrow Connector 8">
-            <a:extLst>
-              <a:ext uri="{FF2B5EF4-FFF2-40B4-BE49-F238E27FC236}">
-                <a16:creationId xmlns:a16="http://schemas.microsoft.com/office/drawing/2014/main" id="{1535B23B-667E-46EB-B811-2ABC7CFCB5A7}"/>
-              </a:ext>
-            </a:extLst>
-          </p:cNvPr>
-          <p:cNvCxnSpPr>
-            <a:cxnSpLocks/>
-            <a:stCxn id="12" idx="1"/>
-          </p:cNvCxnSpPr>
-          <p:nvPr/>
-        </p:nvCxnSpPr>
-        <p:spPr>
-          <a:xfrm flipH="1">
-            <a:off x="6535882" y="3892209"/>
-            <a:ext cx="1119594" cy="0"/>
-          </a:xfrm>
-          <a:prstGeom prst="straightConnector1">
-            <a:avLst/>
-          </a:prstGeom>
-          <a:ln w="57150">
-            <a:solidFill>
-              <a:srgbClr val="FFC000"/>
-            </a:solidFill>
-            <a:tailEnd type="triangle"/>
-          </a:ln>
-        </p:spPr>
-        <p:style>
-          <a:lnRef idx="1">
-            <a:schemeClr val="accent1"/>
-          </a:lnRef>
-          <a:fillRef idx="0">
-            <a:schemeClr val="accent1"/>
-          </a:fillRef>
-          <a:effectRef idx="0">
-            <a:schemeClr val="accent1"/>
-          </a:effectRef>
-          <a:fontRef idx="minor">
-            <a:schemeClr val="tx1"/>
-          </a:fontRef>
-        </p:style>
-      </p:cxnSp>
-      <p:sp>
-        <p:nvSpPr>
-          <p:cNvPr id="12" name="TextBox 11">
-            <a:extLst>
-              <a:ext uri="{FF2B5EF4-FFF2-40B4-BE49-F238E27FC236}">
-                <a16:creationId xmlns:a16="http://schemas.microsoft.com/office/drawing/2014/main" id="{0282A9FE-C87A-4414-A276-329E8AF62300}"/>
-              </a:ext>
-            </a:extLst>
-          </p:cNvPr>
-          <p:cNvSpPr txBox="1"/>
-          <p:nvPr/>
-        </p:nvSpPr>
-        <p:spPr>
-          <a:xfrm>
-            <a:off x="7655476" y="3707543"/>
-            <a:ext cx="4188967" cy="369332"/>
-          </a:xfrm>
-          <a:prstGeom prst="rect">
-            <a:avLst/>
-          </a:prstGeom>
-          <a:noFill/>
-        </p:spPr>
-        <p:txBody>
-          <a:bodyPr wrap="none" rtlCol="0">
-            <a:spAutoFit/>
-          </a:bodyPr>
-          <a:lstStyle/>
-          <a:p>
-            <a:r>
-              <a:rPr lang="en-US" dirty="0"/>
-              <a:t>Circle is at bottom. Switch to more/less than 5.</a:t>
-            </a:r>
-          </a:p>
-        </p:txBody>
-      </p:sp>
-    </p:spTree>
-    <p:extLst>
-      <p:ext uri="{BB962C8B-B14F-4D97-AF65-F5344CB8AC3E}">
-        <p14:creationId xmlns:p14="http://schemas.microsoft.com/office/powerpoint/2010/main" val="3197287014"/>
-      </p:ext>
-    </p:extLst>
-  </p:cSld>
-  <p:clrMapOvr>
-    <a:masterClrMapping/>
-  </p:clrMapOvr>
-</p:sld>
-</file>
-
-<file path=ppt/slides/slide15.xml><?xml version="1.0" encoding="utf-8"?>
 <p:sld xmlns:a="http://schemas.openxmlformats.org/drawingml/2006/main" xmlns:r="http://schemas.openxmlformats.org/officeDocument/2006/relationships" xmlns:p="http://schemas.openxmlformats.org/presentationml/2006/main">
   <p:cSld>
     <p:spTree>
@@ -4728,22 +3407,7 @@
             </a:pPr>
             <a:r>
               <a:rPr lang="en-US" dirty="0"/>
-              <a:t>In this task you will see numbers from 1-9 (excluding 5) appear on the top of the screen one at a time. There will also be a vertical line with a circle on the line. </a:t>
-            </a:r>
-          </a:p>
-          <a:p>
-            <a:pPr marL="0" indent="0" algn="ctr">
-              <a:buNone/>
-            </a:pPr>
-            <a:endParaRPr lang="en-US" dirty="0"/>
-          </a:p>
-          <a:p>
-            <a:pPr marL="0" indent="0" algn="ctr">
-              <a:buNone/>
-            </a:pPr>
-            <a:r>
-              <a:rPr lang="en-US" dirty="0"/>
-              <a:t>There will also be a vertical line with a circle on the line on the top half. </a:t>
+              <a:t>In this task you will a picture appear on the top of the screen one at a time. </a:t>
             </a:r>
           </a:p>
           <a:p>
@@ -4766,7 +3430,7 @@
                   <a:srgbClr val="FF0000"/>
                 </a:solidFill>
               </a:rPr>
-              <a:t>F</a:t>
+              <a:t>G</a:t>
             </a:r>
             <a:r>
               <a:rPr lang="en-US" b="1" dirty="0"/>
@@ -4774,7 +3438,7 @@
             </a:r>
             <a:r>
               <a:rPr lang="en-US" dirty="0"/>
-              <a:t>if the number is an </a:t>
+              <a:t>if the presented face on top is </a:t>
             </a:r>
             <a:r>
               <a:rPr lang="en-US" b="1" dirty="0">
@@ -4782,7 +3446,7 @@
                   <a:srgbClr val="FF0000"/>
                 </a:solidFill>
               </a:rPr>
-              <a:t>odd number</a:t>
+              <a:t>female</a:t>
             </a:r>
             <a:r>
               <a:rPr lang="en-US" dirty="0"/>
@@ -4803,11 +3467,11 @@
                   <a:srgbClr val="00B0F0"/>
                 </a:solidFill>
               </a:rPr>
-              <a:t>J</a:t>
+              <a:t>H</a:t>
             </a:r>
             <a:r>
               <a:rPr lang="en-US" dirty="0"/>
-              <a:t> if the number is an </a:t>
+              <a:t> if the presented face on top is </a:t>
             </a:r>
             <a:r>
               <a:rPr lang="en-US" b="1" dirty="0">
@@ -4815,26 +3479,11 @@
                   <a:srgbClr val="00B0F0"/>
                 </a:solidFill>
               </a:rPr>
-              <a:t>even number</a:t>
+              <a:t>male</a:t>
             </a:r>
             <a:r>
               <a:rPr lang="en-US" b="1" dirty="0"/>
               <a:t>.</a:t>
-            </a:r>
-          </a:p>
-          <a:p>
-            <a:pPr marL="0" indent="0" algn="ctr">
-              <a:buNone/>
-            </a:pPr>
-            <a:endParaRPr lang="en-US" dirty="0"/>
-          </a:p>
-          <a:p>
-            <a:pPr marL="0" indent="0" algn="ctr">
-              <a:buNone/>
-            </a:pPr>
-            <a:r>
-              <a:rPr lang="en-US" dirty="0"/>
-              <a:t>It is important that you respond as quickly and accurately as possible.</a:t>
             </a:r>
           </a:p>
         </p:txBody>
@@ -4900,7 +3549,7 @@
             </a:pPr>
             <a:r>
               <a:rPr lang="en-US" dirty="0"/>
-              <a:t>On some trials, a second number will appear below the vertical line. </a:t>
+              <a:t>On some trials, the picture shifts from the top to the bottom. </a:t>
             </a:r>
           </a:p>
           <a:p>
@@ -4909,22 +3558,7 @@
             </a:pPr>
             <a:r>
               <a:rPr lang="en-US" dirty="0"/>
-              <a:t>If the circle is on the top half of the line, continue with the odd-even discrimination for the top number.</a:t>
-            </a:r>
-          </a:p>
-          <a:p>
-            <a:pPr marL="0" indent="0" algn="ctr">
-              <a:buNone/>
-            </a:pPr>
-            <a:endParaRPr lang="en-US" dirty="0"/>
-          </a:p>
-          <a:p>
-            <a:pPr marL="0" indent="0" algn="ctr">
-              <a:buNone/>
-            </a:pPr>
-            <a:r>
-              <a:rPr lang="en-US" dirty="0"/>
-              <a:t>If the circle is on the bottom half of the line, you will switch to deciding if the number at the bottom of the screen is lower or greater than 5</a:t>
+              <a:t>If the picture is below, decide if the picture shows a happy or angry face</a:t>
             </a:r>
           </a:p>
           <a:p>
@@ -4947,7 +3581,7 @@
                   <a:srgbClr val="FF0000"/>
                 </a:solidFill>
               </a:rPr>
-              <a:t>F</a:t>
+              <a:t>B</a:t>
             </a:r>
             <a:r>
               <a:rPr lang="en-US" b="1" dirty="0"/>
@@ -4955,7 +3589,7 @@
             </a:r>
             <a:r>
               <a:rPr lang="en-US" dirty="0"/>
-              <a:t>if the number is </a:t>
+              <a:t>if the presented face below is </a:t>
             </a:r>
             <a:r>
               <a:rPr lang="en-US" b="1" dirty="0">
@@ -4963,7 +3597,7 @@
                   <a:srgbClr val="FF0000"/>
                 </a:solidFill>
               </a:rPr>
-              <a:t>less than 5</a:t>
+              <a:t>happy</a:t>
             </a:r>
             <a:r>
               <a:rPr lang="en-US" dirty="0"/>
@@ -4984,11 +3618,11 @@
                   <a:srgbClr val="00B0F0"/>
                 </a:solidFill>
               </a:rPr>
-              <a:t>J</a:t>
+              <a:t>N</a:t>
             </a:r>
             <a:r>
               <a:rPr lang="en-US" dirty="0"/>
-              <a:t> if the number is </a:t>
+              <a:t> if the presented face below is </a:t>
             </a:r>
             <a:r>
               <a:rPr lang="en-US" b="1" dirty="0">
@@ -4996,11 +3630,26 @@
                   <a:srgbClr val="00B0F0"/>
                 </a:solidFill>
               </a:rPr>
-              <a:t>more than 5</a:t>
+              <a:t>angry</a:t>
             </a:r>
             <a:r>
               <a:rPr lang="en-US" b="1" dirty="0"/>
               <a:t>.</a:t>
+            </a:r>
+          </a:p>
+          <a:p>
+            <a:pPr marL="0" indent="0" algn="ctr">
+              <a:buNone/>
+            </a:pPr>
+            <a:endParaRPr lang="en-US" b="1" dirty="0"/>
+          </a:p>
+          <a:p>
+            <a:pPr marL="0" indent="0" algn="ctr">
+              <a:buNone/>
+            </a:pPr>
+            <a:r>
+              <a:rPr lang="en-US" dirty="0"/>
+              <a:t>It is important that you respond as quickly and accurately as possible.</a:t>
             </a:r>
           </a:p>
         </p:txBody>
@@ -5102,143 +3751,6 @@
           <a:chExt cx="0" cy="0"/>
         </a:xfrm>
       </p:grpSpPr>
-      <p:sp>
-        <p:nvSpPr>
-          <p:cNvPr id="4" name="TextBox 3">
-            <a:extLst>
-              <a:ext uri="{FF2B5EF4-FFF2-40B4-BE49-F238E27FC236}">
-                <a16:creationId xmlns:a16="http://schemas.microsoft.com/office/drawing/2014/main" id="{045EBAC0-D53D-4EA9-B71F-B4ABEF313ECB}"/>
-              </a:ext>
-            </a:extLst>
-          </p:cNvPr>
-          <p:cNvSpPr txBox="1"/>
-          <p:nvPr/>
-        </p:nvSpPr>
-        <p:spPr>
-          <a:xfrm>
-            <a:off x="5847374" y="847899"/>
-            <a:ext cx="497252" cy="923330"/>
-          </a:xfrm>
-          <a:prstGeom prst="rect">
-            <a:avLst/>
-          </a:prstGeom>
-          <a:noFill/>
-        </p:spPr>
-        <p:txBody>
-          <a:bodyPr wrap="none" rtlCol="0">
-            <a:spAutoFit/>
-          </a:bodyPr>
-          <a:lstStyle/>
-          <a:p>
-            <a:r>
-              <a:rPr lang="en-US" sz="5400" dirty="0"/>
-              <a:t>1</a:t>
-            </a:r>
-          </a:p>
-        </p:txBody>
-      </p:sp>
-      <p:cxnSp>
-        <p:nvCxnSpPr>
-          <p:cNvPr id="6" name="Straight Connector 5">
-            <a:extLst>
-              <a:ext uri="{FF2B5EF4-FFF2-40B4-BE49-F238E27FC236}">
-                <a16:creationId xmlns:a16="http://schemas.microsoft.com/office/drawing/2014/main" id="{8C184E1D-CF59-4C96-8CCE-250D00DBE68C}"/>
-              </a:ext>
-            </a:extLst>
-          </p:cNvPr>
-          <p:cNvCxnSpPr>
-            <a:cxnSpLocks/>
-            <a:stCxn id="4" idx="2"/>
-          </p:cNvCxnSpPr>
-          <p:nvPr/>
-        </p:nvCxnSpPr>
-        <p:spPr>
-          <a:xfrm>
-            <a:off x="6096000" y="1771229"/>
-            <a:ext cx="0" cy="2875586"/>
-          </a:xfrm>
-          <a:prstGeom prst="line">
-            <a:avLst/>
-          </a:prstGeom>
-          <a:ln w="76200">
-            <a:solidFill>
-              <a:schemeClr val="tx1">
-                <a:lumMod val="50000"/>
-              </a:schemeClr>
-            </a:solidFill>
-          </a:ln>
-        </p:spPr>
-        <p:style>
-          <a:lnRef idx="1">
-            <a:schemeClr val="accent1"/>
-          </a:lnRef>
-          <a:fillRef idx="0">
-            <a:schemeClr val="accent1"/>
-          </a:fillRef>
-          <a:effectRef idx="0">
-            <a:schemeClr val="accent1"/>
-          </a:effectRef>
-          <a:fontRef idx="minor">
-            <a:schemeClr val="tx1"/>
-          </a:fontRef>
-        </p:style>
-      </p:cxnSp>
-      <p:sp>
-        <p:nvSpPr>
-          <p:cNvPr id="8" name="Oval 7">
-            <a:extLst>
-              <a:ext uri="{FF2B5EF4-FFF2-40B4-BE49-F238E27FC236}">
-                <a16:creationId xmlns:a16="http://schemas.microsoft.com/office/drawing/2014/main" id="{D780B0A6-9031-423A-8AC2-37C18347E369}"/>
-              </a:ext>
-            </a:extLst>
-          </p:cNvPr>
-          <p:cNvSpPr/>
-          <p:nvPr/>
-        </p:nvSpPr>
-        <p:spPr>
-          <a:xfrm>
-            <a:off x="5961613" y="2019994"/>
-            <a:ext cx="275706" cy="275706"/>
-          </a:xfrm>
-          <a:prstGeom prst="ellipse">
-            <a:avLst/>
-          </a:prstGeom>
-          <a:solidFill>
-            <a:schemeClr val="tx1">
-              <a:lumMod val="65000"/>
-            </a:schemeClr>
-          </a:solidFill>
-          <a:ln>
-            <a:solidFill>
-              <a:schemeClr val="tx1"/>
-            </a:solidFill>
-          </a:ln>
-        </p:spPr>
-        <p:style>
-          <a:lnRef idx="2">
-            <a:schemeClr val="accent1">
-              <a:shade val="50000"/>
-            </a:schemeClr>
-          </a:lnRef>
-          <a:fillRef idx="1">
-            <a:schemeClr val="accent1"/>
-          </a:fillRef>
-          <a:effectRef idx="0">
-            <a:schemeClr val="accent1"/>
-          </a:effectRef>
-          <a:fontRef idx="minor">
-            <a:schemeClr val="lt1"/>
-          </a:fontRef>
-        </p:style>
-        <p:txBody>
-          <a:bodyPr rtlCol="0" anchor="ctr"/>
-          <a:lstStyle/>
-          <a:p>
-            <a:pPr algn="ctr"/>
-            <a:endParaRPr lang="en-US"/>
-          </a:p>
-        </p:txBody>
-      </p:sp>
       <p:cxnSp>
         <p:nvCxnSpPr>
           <p:cNvPr id="10" name="Straight Arrow Connector 9">
@@ -5256,7 +3768,7 @@
         </p:nvCxnSpPr>
         <p:spPr>
           <a:xfrm flipH="1">
-            <a:off x="6650182" y="1246909"/>
+            <a:off x="7387754" y="1695642"/>
             <a:ext cx="1119594" cy="0"/>
           </a:xfrm>
           <a:prstGeom prst="straightConnector1">
@@ -5298,8 +3810,8 @@
         </p:nvSpPr>
         <p:spPr>
           <a:xfrm>
-            <a:off x="7769776" y="1062243"/>
-            <a:ext cx="2010487" cy="369332"/>
+            <a:off x="8507348" y="1510976"/>
+            <a:ext cx="2728632" cy="369332"/>
           </a:xfrm>
           <a:prstGeom prst="rect">
             <a:avLst/>
@@ -5314,15 +3826,128 @@
           <a:p>
             <a:r>
               <a:rPr lang="en-US" dirty="0"/>
-              <a:t>Odd number. Press F</a:t>
-            </a:r>
-          </a:p>
-        </p:txBody>
-      </p:sp>
+              <a:t>Face on top is female. Press G</a:t>
+            </a:r>
+          </a:p>
+        </p:txBody>
+      </p:sp>
+      <p:grpSp>
+        <p:nvGrpSpPr>
+          <p:cNvPr id="7" name="Group 6">
+            <a:extLst>
+              <a:ext uri="{FF2B5EF4-FFF2-40B4-BE49-F238E27FC236}">
+                <a16:creationId xmlns:a16="http://schemas.microsoft.com/office/drawing/2014/main" id="{59368371-B861-4B24-9FC8-C8254E504709}"/>
+              </a:ext>
+            </a:extLst>
+          </p:cNvPr>
+          <p:cNvGrpSpPr/>
+          <p:nvPr/>
+        </p:nvGrpSpPr>
+        <p:grpSpPr>
+          <a:xfrm>
+            <a:off x="4194889" y="789442"/>
+            <a:ext cx="2894783" cy="4601715"/>
+            <a:chOff x="2239226" y="2423141"/>
+            <a:chExt cx="1298597" cy="2064325"/>
+          </a:xfrm>
+        </p:grpSpPr>
+        <p:sp>
+          <p:nvSpPr>
+            <p:cNvPr id="9" name="Rectangle 8">
+              <a:extLst>
+                <a:ext uri="{FF2B5EF4-FFF2-40B4-BE49-F238E27FC236}">
+                  <a16:creationId xmlns:a16="http://schemas.microsoft.com/office/drawing/2014/main" id="{E33E69C8-8389-4F64-B64F-B1BF66EA84FA}"/>
+                </a:ext>
+              </a:extLst>
+            </p:cNvPr>
+            <p:cNvSpPr/>
+            <p:nvPr/>
+          </p:nvSpPr>
+          <p:spPr>
+            <a:xfrm>
+              <a:off x="2239226" y="2423141"/>
+              <a:ext cx="1298597" cy="2064325"/>
+            </a:xfrm>
+            <a:prstGeom prst="rect">
+              <a:avLst/>
+            </a:prstGeom>
+            <a:solidFill>
+              <a:schemeClr val="bg1"/>
+            </a:solidFill>
+            <a:ln w="38100">
+              <a:solidFill>
+                <a:schemeClr val="tx1"/>
+              </a:solidFill>
+            </a:ln>
+          </p:spPr>
+          <p:style>
+            <a:lnRef idx="2">
+              <a:schemeClr val="accent1">
+                <a:shade val="50000"/>
+              </a:schemeClr>
+            </a:lnRef>
+            <a:fillRef idx="1">
+              <a:schemeClr val="accent1"/>
+            </a:fillRef>
+            <a:effectRef idx="0">
+              <a:schemeClr val="accent1"/>
+            </a:effectRef>
+            <a:fontRef idx="minor">
+              <a:schemeClr val="lt1"/>
+            </a:fontRef>
+          </p:style>
+          <p:txBody>
+            <a:bodyPr rtlCol="0" anchor="ctr"/>
+            <a:lstStyle/>
+            <a:p>
+              <a:pPr algn="ctr"/>
+              <a:r>
+                <a:rPr lang="en-US" dirty="0"/>
+                <a:t>+</a:t>
+              </a:r>
+            </a:p>
+          </p:txBody>
+        </p:sp>
+        <p:pic>
+          <p:nvPicPr>
+            <p:cNvPr id="12" name="Picture 11">
+              <a:extLst>
+                <a:ext uri="{FF2B5EF4-FFF2-40B4-BE49-F238E27FC236}">
+                  <a16:creationId xmlns:a16="http://schemas.microsoft.com/office/drawing/2014/main" id="{63F39C27-CE35-49F1-AC62-69A7BD1CB85F}"/>
+                </a:ext>
+              </a:extLst>
+            </p:cNvPr>
+            <p:cNvPicPr>
+              <a:picLocks noChangeAspect="1"/>
+            </p:cNvPicPr>
+            <p:nvPr/>
+          </p:nvPicPr>
+          <p:blipFill>
+            <a:blip r:embed="rId2">
+              <a:extLst>
+                <a:ext uri="{28A0092B-C50C-407E-A947-70E740481C1C}">
+                  <a14:useLocalDpi xmlns:a14="http://schemas.microsoft.com/office/drawing/2010/main" val="0"/>
+                </a:ext>
+              </a:extLst>
+            </a:blip>
+            <a:srcRect/>
+            <a:stretch/>
+          </p:blipFill>
+          <p:spPr>
+            <a:xfrm>
+              <a:off x="2630542" y="2577861"/>
+              <a:ext cx="515966" cy="698705"/>
+            </a:xfrm>
+            <a:prstGeom prst="rect">
+              <a:avLst/>
+            </a:prstGeom>
+          </p:spPr>
+        </p:pic>
+      </p:grpSp>
     </p:spTree>
     <p:extLst>
       <p:ext uri="{BB962C8B-B14F-4D97-AF65-F5344CB8AC3E}">
-        <p14:creationId xmlns:p14="http://schemas.microsoft.com/office/powerpoint/2010/main" val="3346351900"/>
+        <p14:creationId xmlns:p14="http://schemas.microsoft.com/office/powerpoint/2010/main" val="1111390835"/>
       </p:ext>
     </p:extLst>
   </p:cSld>
@@ -5349,161 +3974,136 @@
           <a:chExt cx="0" cy="0"/>
         </a:xfrm>
       </p:grpSpPr>
-      <p:sp>
-        <p:nvSpPr>
-          <p:cNvPr id="4" name="TextBox 3">
+      <p:grpSp>
+        <p:nvGrpSpPr>
+          <p:cNvPr id="2" name="Group 1">
             <a:extLst>
               <a:ext uri="{FF2B5EF4-FFF2-40B4-BE49-F238E27FC236}">
-                <a16:creationId xmlns:a16="http://schemas.microsoft.com/office/drawing/2014/main" id="{045EBAC0-D53D-4EA9-B71F-B4ABEF313ECB}"/>
+                <a16:creationId xmlns:a16="http://schemas.microsoft.com/office/drawing/2014/main" id="{04B7BBA1-A201-419E-93D5-DA533C0D7D8E}"/>
               </a:ext>
             </a:extLst>
           </p:cNvPr>
-          <p:cNvSpPr txBox="1"/>
+          <p:cNvGrpSpPr/>
           <p:nvPr/>
-        </p:nvSpPr>
-        <p:spPr>
+        </p:nvGrpSpPr>
+        <p:grpSpPr>
           <a:xfrm>
-            <a:off x="5847374" y="847899"/>
-            <a:ext cx="497252" cy="923330"/>
+            <a:off x="4194889" y="789442"/>
+            <a:ext cx="2894783" cy="4601715"/>
+            <a:chOff x="4194889" y="789442"/>
+            <a:chExt cx="2894783" cy="4601715"/>
           </a:xfrm>
-          <a:prstGeom prst="rect">
-            <a:avLst/>
-          </a:prstGeom>
-          <a:noFill/>
-        </p:spPr>
-        <p:txBody>
-          <a:bodyPr wrap="none" rtlCol="0">
-            <a:spAutoFit/>
-          </a:bodyPr>
-          <a:lstStyle/>
-          <a:p>
-            <a:r>
-              <a:rPr lang="en-US" sz="5400" dirty="0"/>
-              <a:t>8</a:t>
-            </a:r>
-          </a:p>
-        </p:txBody>
-      </p:sp>
+        </p:grpSpPr>
+        <p:sp>
+          <p:nvSpPr>
+            <p:cNvPr id="9" name="Rectangle 8">
+              <a:extLst>
+                <a:ext uri="{FF2B5EF4-FFF2-40B4-BE49-F238E27FC236}">
+                  <a16:creationId xmlns:a16="http://schemas.microsoft.com/office/drawing/2014/main" id="{E33E69C8-8389-4F64-B64F-B1BF66EA84FA}"/>
+                </a:ext>
+              </a:extLst>
+            </p:cNvPr>
+            <p:cNvSpPr/>
+            <p:nvPr/>
+          </p:nvSpPr>
+          <p:spPr>
+            <a:xfrm>
+              <a:off x="4194889" y="789442"/>
+              <a:ext cx="2894783" cy="4601715"/>
+            </a:xfrm>
+            <a:prstGeom prst="rect">
+              <a:avLst/>
+            </a:prstGeom>
+            <a:solidFill>
+              <a:schemeClr val="bg1"/>
+            </a:solidFill>
+            <a:ln w="38100">
+              <a:solidFill>
+                <a:schemeClr val="tx1"/>
+              </a:solidFill>
+            </a:ln>
+          </p:spPr>
+          <p:style>
+            <a:lnRef idx="2">
+              <a:schemeClr val="accent1">
+                <a:shade val="50000"/>
+              </a:schemeClr>
+            </a:lnRef>
+            <a:fillRef idx="1">
+              <a:schemeClr val="accent1"/>
+            </a:fillRef>
+            <a:effectRef idx="0">
+              <a:schemeClr val="accent1"/>
+            </a:effectRef>
+            <a:fontRef idx="minor">
+              <a:schemeClr val="lt1"/>
+            </a:fontRef>
+          </p:style>
+          <p:txBody>
+            <a:bodyPr rtlCol="0" anchor="ctr"/>
+            <a:lstStyle/>
+            <a:p>
+              <a:pPr algn="ctr"/>
+              <a:r>
+                <a:rPr lang="en-US" dirty="0"/>
+                <a:t>+</a:t>
+              </a:r>
+            </a:p>
+          </p:txBody>
+        </p:sp>
+        <p:pic>
+          <p:nvPicPr>
+            <p:cNvPr id="28" name="Picture 27">
+              <a:extLst>
+                <a:ext uri="{FF2B5EF4-FFF2-40B4-BE49-F238E27FC236}">
+                  <a16:creationId xmlns:a16="http://schemas.microsoft.com/office/drawing/2014/main" id="{626CF07D-C5A6-4E64-BB1A-0A0FE09F3448}"/>
+                </a:ext>
+              </a:extLst>
+            </p:cNvPr>
+            <p:cNvPicPr>
+              <a:picLocks noChangeAspect="1"/>
+            </p:cNvPicPr>
+            <p:nvPr/>
+          </p:nvPicPr>
+          <p:blipFill>
+            <a:blip r:embed="rId2">
+              <a:extLst>
+                <a:ext uri="{28A0092B-C50C-407E-A947-70E740481C1C}">
+                  <a14:useLocalDpi xmlns:a14="http://schemas.microsoft.com/office/drawing/2010/main" val="0"/>
+                </a:ext>
+              </a:extLst>
+            </a:blip>
+            <a:srcRect/>
+            <a:stretch/>
+          </p:blipFill>
+          <p:spPr>
+            <a:xfrm>
+              <a:off x="5067194" y="1143502"/>
+              <a:ext cx="1150172" cy="1557526"/>
+            </a:xfrm>
+            <a:prstGeom prst="rect">
+              <a:avLst/>
+            </a:prstGeom>
+          </p:spPr>
+        </p:pic>
+      </p:grpSp>
       <p:cxnSp>
         <p:nvCxnSpPr>
-          <p:cNvPr id="6" name="Straight Connector 5">
+          <p:cNvPr id="31" name="Straight Arrow Connector 30">
             <a:extLst>
               <a:ext uri="{FF2B5EF4-FFF2-40B4-BE49-F238E27FC236}">
-                <a16:creationId xmlns:a16="http://schemas.microsoft.com/office/drawing/2014/main" id="{8C184E1D-CF59-4C96-8CCE-250D00DBE68C}"/>
+                <a16:creationId xmlns:a16="http://schemas.microsoft.com/office/drawing/2014/main" id="{B9998150-4669-4064-9E84-5CF60E5B513F}"/>
               </a:ext>
             </a:extLst>
           </p:cNvPr>
           <p:cNvCxnSpPr>
             <a:cxnSpLocks/>
-            <a:stCxn id="4" idx="2"/>
-          </p:cNvCxnSpPr>
-          <p:nvPr/>
-        </p:nvCxnSpPr>
-        <p:spPr>
-          <a:xfrm>
-            <a:off x="6096000" y="1771229"/>
-            <a:ext cx="0" cy="2875586"/>
-          </a:xfrm>
-          <a:prstGeom prst="line">
-            <a:avLst/>
-          </a:prstGeom>
-          <a:ln w="76200">
-            <a:solidFill>
-              <a:schemeClr val="tx1">
-                <a:lumMod val="50000"/>
-              </a:schemeClr>
-            </a:solidFill>
-          </a:ln>
-        </p:spPr>
-        <p:style>
-          <a:lnRef idx="1">
-            <a:schemeClr val="accent1"/>
-          </a:lnRef>
-          <a:fillRef idx="0">
-            <a:schemeClr val="accent1"/>
-          </a:fillRef>
-          <a:effectRef idx="0">
-            <a:schemeClr val="accent1"/>
-          </a:effectRef>
-          <a:fontRef idx="minor">
-            <a:schemeClr val="tx1"/>
-          </a:fontRef>
-        </p:style>
-      </p:cxnSp>
-      <p:sp>
-        <p:nvSpPr>
-          <p:cNvPr id="8" name="Oval 7">
-            <a:extLst>
-              <a:ext uri="{FF2B5EF4-FFF2-40B4-BE49-F238E27FC236}">
-                <a16:creationId xmlns:a16="http://schemas.microsoft.com/office/drawing/2014/main" id="{D780B0A6-9031-423A-8AC2-37C18347E369}"/>
-              </a:ext>
-            </a:extLst>
-          </p:cNvPr>
-          <p:cNvSpPr/>
-          <p:nvPr/>
-        </p:nvSpPr>
-        <p:spPr>
-          <a:xfrm>
-            <a:off x="5961613" y="2019994"/>
-            <a:ext cx="275706" cy="275706"/>
-          </a:xfrm>
-          <a:prstGeom prst="ellipse">
-            <a:avLst/>
-          </a:prstGeom>
-          <a:solidFill>
-            <a:schemeClr val="tx1">
-              <a:lumMod val="65000"/>
-            </a:schemeClr>
-          </a:solidFill>
-          <a:ln>
-            <a:solidFill>
-              <a:schemeClr val="tx1"/>
-            </a:solidFill>
-          </a:ln>
-        </p:spPr>
-        <p:style>
-          <a:lnRef idx="2">
-            <a:schemeClr val="accent1">
-              <a:shade val="50000"/>
-            </a:schemeClr>
-          </a:lnRef>
-          <a:fillRef idx="1">
-            <a:schemeClr val="accent1"/>
-          </a:fillRef>
-          <a:effectRef idx="0">
-            <a:schemeClr val="accent1"/>
-          </a:effectRef>
-          <a:fontRef idx="minor">
-            <a:schemeClr val="lt1"/>
-          </a:fontRef>
-        </p:style>
-        <p:txBody>
-          <a:bodyPr rtlCol="0" anchor="ctr"/>
-          <a:lstStyle/>
-          <a:p>
-            <a:pPr algn="ctr"/>
-            <a:endParaRPr lang="en-US"/>
-          </a:p>
-        </p:txBody>
-      </p:sp>
-      <p:cxnSp>
-        <p:nvCxnSpPr>
-          <p:cNvPr id="10" name="Straight Arrow Connector 9">
-            <a:extLst>
-              <a:ext uri="{FF2B5EF4-FFF2-40B4-BE49-F238E27FC236}">
-                <a16:creationId xmlns:a16="http://schemas.microsoft.com/office/drawing/2014/main" id="{87A68CCB-8D05-4BD9-BDDE-EE29FEECE518}"/>
-              </a:ext>
-            </a:extLst>
-          </p:cNvPr>
-          <p:cNvCxnSpPr>
-            <a:cxnSpLocks/>
-            <a:stCxn id="11" idx="1"/>
           </p:cNvCxnSpPr>
           <p:nvPr/>
         </p:nvCxnSpPr>
         <p:spPr>
           <a:xfrm flipH="1">
-            <a:off x="6650182" y="1246909"/>
+            <a:off x="7387754" y="1695642"/>
             <a:ext cx="1119594" cy="0"/>
           </a:xfrm>
           <a:prstGeom prst="straightConnector1">
@@ -5533,10 +4133,10 @@
       </p:cxnSp>
       <p:sp>
         <p:nvSpPr>
-          <p:cNvPr id="11" name="TextBox 10">
+          <p:cNvPr id="32" name="TextBox 31">
             <a:extLst>
               <a:ext uri="{FF2B5EF4-FFF2-40B4-BE49-F238E27FC236}">
-                <a16:creationId xmlns:a16="http://schemas.microsoft.com/office/drawing/2014/main" id="{345EDC75-7580-4EBA-A325-774C0DF7FACC}"/>
+                <a16:creationId xmlns:a16="http://schemas.microsoft.com/office/drawing/2014/main" id="{7DFF8D84-F556-4DA2-A9F8-D8BA52B0F355}"/>
               </a:ext>
             </a:extLst>
           </p:cNvPr>
@@ -5545,8 +4145,8 @@
         </p:nvSpPr>
         <p:spPr>
           <a:xfrm>
-            <a:off x="7769776" y="1062243"/>
-            <a:ext cx="2055371" cy="369332"/>
+            <a:off x="8507348" y="1510976"/>
+            <a:ext cx="2728632" cy="369332"/>
           </a:xfrm>
           <a:prstGeom prst="rect">
             <a:avLst/>
@@ -5561,7 +4161,7 @@
           <a:p>
             <a:r>
               <a:rPr lang="en-US" dirty="0"/>
-              <a:t>Even number. Press J</a:t>
+              <a:t>Face on top is female. Press G</a:t>
             </a:r>
           </a:p>
         </p:txBody>
@@ -5569,7 +4169,7 @@
     </p:spTree>
     <p:extLst>
       <p:ext uri="{BB962C8B-B14F-4D97-AF65-F5344CB8AC3E}">
-        <p14:creationId xmlns:p14="http://schemas.microsoft.com/office/powerpoint/2010/main" val="3992007765"/>
+        <p14:creationId xmlns:p14="http://schemas.microsoft.com/office/powerpoint/2010/main" val="483690788"/>
       </p:ext>
     </p:extLst>
   </p:cSld>
@@ -5596,161 +4196,136 @@
           <a:chExt cx="0" cy="0"/>
         </a:xfrm>
       </p:grpSpPr>
-      <p:sp>
-        <p:nvSpPr>
-          <p:cNvPr id="4" name="TextBox 3">
+      <p:grpSp>
+        <p:nvGrpSpPr>
+          <p:cNvPr id="3" name="Group 2">
             <a:extLst>
               <a:ext uri="{FF2B5EF4-FFF2-40B4-BE49-F238E27FC236}">
-                <a16:creationId xmlns:a16="http://schemas.microsoft.com/office/drawing/2014/main" id="{045EBAC0-D53D-4EA9-B71F-B4ABEF313ECB}"/>
+                <a16:creationId xmlns:a16="http://schemas.microsoft.com/office/drawing/2014/main" id="{D1F7F71C-A431-41ED-9F4D-34541348D9FA}"/>
               </a:ext>
             </a:extLst>
           </p:cNvPr>
-          <p:cNvSpPr txBox="1"/>
+          <p:cNvGrpSpPr/>
           <p:nvPr/>
-        </p:nvSpPr>
-        <p:spPr>
+        </p:nvGrpSpPr>
+        <p:grpSpPr>
           <a:xfrm>
-            <a:off x="5847374" y="847899"/>
-            <a:ext cx="497252" cy="923330"/>
+            <a:off x="4194889" y="789442"/>
+            <a:ext cx="2894783" cy="4601715"/>
+            <a:chOff x="4194889" y="789442"/>
+            <a:chExt cx="2894783" cy="4601715"/>
           </a:xfrm>
-          <a:prstGeom prst="rect">
-            <a:avLst/>
-          </a:prstGeom>
-          <a:noFill/>
-        </p:spPr>
-        <p:txBody>
-          <a:bodyPr wrap="none" rtlCol="0">
-            <a:spAutoFit/>
-          </a:bodyPr>
-          <a:lstStyle/>
-          <a:p>
-            <a:r>
-              <a:rPr lang="en-US" sz="5400" dirty="0"/>
-              <a:t>2</a:t>
-            </a:r>
-          </a:p>
-        </p:txBody>
-      </p:sp>
+        </p:grpSpPr>
+        <p:sp>
+          <p:nvSpPr>
+            <p:cNvPr id="9" name="Rectangle 8">
+              <a:extLst>
+                <a:ext uri="{FF2B5EF4-FFF2-40B4-BE49-F238E27FC236}">
+                  <a16:creationId xmlns:a16="http://schemas.microsoft.com/office/drawing/2014/main" id="{E33E69C8-8389-4F64-B64F-B1BF66EA84FA}"/>
+                </a:ext>
+              </a:extLst>
+            </p:cNvPr>
+            <p:cNvSpPr/>
+            <p:nvPr/>
+          </p:nvSpPr>
+          <p:spPr>
+            <a:xfrm>
+              <a:off x="4194889" y="789442"/>
+              <a:ext cx="2894783" cy="4601715"/>
+            </a:xfrm>
+            <a:prstGeom prst="rect">
+              <a:avLst/>
+            </a:prstGeom>
+            <a:solidFill>
+              <a:schemeClr val="bg1"/>
+            </a:solidFill>
+            <a:ln w="38100">
+              <a:solidFill>
+                <a:schemeClr val="tx1"/>
+              </a:solidFill>
+            </a:ln>
+          </p:spPr>
+          <p:style>
+            <a:lnRef idx="2">
+              <a:schemeClr val="accent1">
+                <a:shade val="50000"/>
+              </a:schemeClr>
+            </a:lnRef>
+            <a:fillRef idx="1">
+              <a:schemeClr val="accent1"/>
+            </a:fillRef>
+            <a:effectRef idx="0">
+              <a:schemeClr val="accent1"/>
+            </a:effectRef>
+            <a:fontRef idx="minor">
+              <a:schemeClr val="lt1"/>
+            </a:fontRef>
+          </p:style>
+          <p:txBody>
+            <a:bodyPr rtlCol="0" anchor="ctr"/>
+            <a:lstStyle/>
+            <a:p>
+              <a:pPr algn="ctr"/>
+              <a:r>
+                <a:rPr lang="en-US" dirty="0"/>
+                <a:t>+</a:t>
+              </a:r>
+            </a:p>
+          </p:txBody>
+        </p:sp>
+        <p:pic>
+          <p:nvPicPr>
+            <p:cNvPr id="7" name="Picture 6">
+              <a:extLst>
+                <a:ext uri="{FF2B5EF4-FFF2-40B4-BE49-F238E27FC236}">
+                  <a16:creationId xmlns:a16="http://schemas.microsoft.com/office/drawing/2014/main" id="{4C2F6B23-84D7-4635-ABF4-B5FC6FE702FE}"/>
+                </a:ext>
+              </a:extLst>
+            </p:cNvPr>
+            <p:cNvPicPr>
+              <a:picLocks noChangeAspect="1"/>
+            </p:cNvPicPr>
+            <p:nvPr/>
+          </p:nvPicPr>
+          <p:blipFill>
+            <a:blip r:embed="rId2">
+              <a:extLst>
+                <a:ext uri="{28A0092B-C50C-407E-A947-70E740481C1C}">
+                  <a14:useLocalDpi xmlns:a14="http://schemas.microsoft.com/office/drawing/2010/main" val="0"/>
+                </a:ext>
+              </a:extLst>
+            </a:blip>
+            <a:srcRect/>
+            <a:stretch/>
+          </p:blipFill>
+          <p:spPr>
+            <a:xfrm>
+              <a:off x="5067194" y="1143502"/>
+              <a:ext cx="1150171" cy="1557526"/>
+            </a:xfrm>
+            <a:prstGeom prst="rect">
+              <a:avLst/>
+            </a:prstGeom>
+          </p:spPr>
+        </p:pic>
+      </p:grpSp>
       <p:cxnSp>
         <p:nvCxnSpPr>
-          <p:cNvPr id="6" name="Straight Connector 5">
+          <p:cNvPr id="11" name="Straight Arrow Connector 10">
             <a:extLst>
               <a:ext uri="{FF2B5EF4-FFF2-40B4-BE49-F238E27FC236}">
-                <a16:creationId xmlns:a16="http://schemas.microsoft.com/office/drawing/2014/main" id="{8C184E1D-CF59-4C96-8CCE-250D00DBE68C}"/>
+                <a16:creationId xmlns:a16="http://schemas.microsoft.com/office/drawing/2014/main" id="{6FD87256-31BE-45A6-876F-750367FD3862}"/>
               </a:ext>
             </a:extLst>
           </p:cNvPr>
           <p:cNvCxnSpPr>
             <a:cxnSpLocks/>
-            <a:stCxn id="4" idx="2"/>
-          </p:cNvCxnSpPr>
-          <p:nvPr/>
-        </p:nvCxnSpPr>
-        <p:spPr>
-          <a:xfrm>
-            <a:off x="6096000" y="1771229"/>
-            <a:ext cx="0" cy="2875586"/>
-          </a:xfrm>
-          <a:prstGeom prst="line">
-            <a:avLst/>
-          </a:prstGeom>
-          <a:ln w="76200">
-            <a:solidFill>
-              <a:schemeClr val="tx1">
-                <a:lumMod val="50000"/>
-              </a:schemeClr>
-            </a:solidFill>
-          </a:ln>
-        </p:spPr>
-        <p:style>
-          <a:lnRef idx="1">
-            <a:schemeClr val="accent1"/>
-          </a:lnRef>
-          <a:fillRef idx="0">
-            <a:schemeClr val="accent1"/>
-          </a:fillRef>
-          <a:effectRef idx="0">
-            <a:schemeClr val="accent1"/>
-          </a:effectRef>
-          <a:fontRef idx="minor">
-            <a:schemeClr val="tx1"/>
-          </a:fontRef>
-        </p:style>
-      </p:cxnSp>
-      <p:sp>
-        <p:nvSpPr>
-          <p:cNvPr id="8" name="Oval 7">
-            <a:extLst>
-              <a:ext uri="{FF2B5EF4-FFF2-40B4-BE49-F238E27FC236}">
-                <a16:creationId xmlns:a16="http://schemas.microsoft.com/office/drawing/2014/main" id="{D780B0A6-9031-423A-8AC2-37C18347E369}"/>
-              </a:ext>
-            </a:extLst>
-          </p:cNvPr>
-          <p:cNvSpPr/>
-          <p:nvPr/>
-        </p:nvSpPr>
-        <p:spPr>
-          <a:xfrm>
-            <a:off x="5961613" y="2019994"/>
-            <a:ext cx="275706" cy="275706"/>
-          </a:xfrm>
-          <a:prstGeom prst="ellipse">
-            <a:avLst/>
-          </a:prstGeom>
-          <a:solidFill>
-            <a:schemeClr val="tx1">
-              <a:lumMod val="65000"/>
-            </a:schemeClr>
-          </a:solidFill>
-          <a:ln>
-            <a:solidFill>
-              <a:schemeClr val="tx1"/>
-            </a:solidFill>
-          </a:ln>
-        </p:spPr>
-        <p:style>
-          <a:lnRef idx="2">
-            <a:schemeClr val="accent1">
-              <a:shade val="50000"/>
-            </a:schemeClr>
-          </a:lnRef>
-          <a:fillRef idx="1">
-            <a:schemeClr val="accent1"/>
-          </a:fillRef>
-          <a:effectRef idx="0">
-            <a:schemeClr val="accent1"/>
-          </a:effectRef>
-          <a:fontRef idx="minor">
-            <a:schemeClr val="lt1"/>
-          </a:fontRef>
-        </p:style>
-        <p:txBody>
-          <a:bodyPr rtlCol="0" anchor="ctr"/>
-          <a:lstStyle/>
-          <a:p>
-            <a:pPr algn="ctr"/>
-            <a:endParaRPr lang="en-US"/>
-          </a:p>
-        </p:txBody>
-      </p:sp>
-      <p:cxnSp>
-        <p:nvCxnSpPr>
-          <p:cNvPr id="10" name="Straight Arrow Connector 9">
-            <a:extLst>
-              <a:ext uri="{FF2B5EF4-FFF2-40B4-BE49-F238E27FC236}">
-                <a16:creationId xmlns:a16="http://schemas.microsoft.com/office/drawing/2014/main" id="{87A68CCB-8D05-4BD9-BDDE-EE29FEECE518}"/>
-              </a:ext>
-            </a:extLst>
-          </p:cNvPr>
-          <p:cNvCxnSpPr>
-            <a:cxnSpLocks/>
-            <a:stCxn id="11" idx="1"/>
           </p:cNvCxnSpPr>
           <p:nvPr/>
         </p:nvCxnSpPr>
         <p:spPr>
           <a:xfrm flipH="1">
-            <a:off x="6650182" y="1246909"/>
+            <a:off x="7387754" y="1695642"/>
             <a:ext cx="1119594" cy="0"/>
           </a:xfrm>
           <a:prstGeom prst="straightConnector1">
@@ -5780,10 +4355,10 @@
       </p:cxnSp>
       <p:sp>
         <p:nvSpPr>
-          <p:cNvPr id="11" name="TextBox 10">
+          <p:cNvPr id="12" name="TextBox 11">
             <a:extLst>
               <a:ext uri="{FF2B5EF4-FFF2-40B4-BE49-F238E27FC236}">
-                <a16:creationId xmlns:a16="http://schemas.microsoft.com/office/drawing/2014/main" id="{345EDC75-7580-4EBA-A325-774C0DF7FACC}"/>
+                <a16:creationId xmlns:a16="http://schemas.microsoft.com/office/drawing/2014/main" id="{0E271C3E-2FF2-4F74-973E-1E2A68ADE041}"/>
               </a:ext>
             </a:extLst>
           </p:cNvPr>
@@ -5792,8 +4367,8 @@
         </p:nvSpPr>
         <p:spPr>
           <a:xfrm>
-            <a:off x="7769776" y="1062243"/>
-            <a:ext cx="2055371" cy="369332"/>
+            <a:off x="8507348" y="1510976"/>
+            <a:ext cx="2574744" cy="369332"/>
           </a:xfrm>
           <a:prstGeom prst="rect">
             <a:avLst/>
@@ -5808,7 +4383,7 @@
           <a:p>
             <a:r>
               <a:rPr lang="en-US" dirty="0"/>
-              <a:t>Even number. Press J</a:t>
+              <a:t>Face on top is male. Press H</a:t>
             </a:r>
           </a:p>
         </p:txBody>
@@ -5816,7 +4391,7 @@
     </p:spTree>
     <p:extLst>
       <p:ext uri="{BB962C8B-B14F-4D97-AF65-F5344CB8AC3E}">
-        <p14:creationId xmlns:p14="http://schemas.microsoft.com/office/powerpoint/2010/main" val="1278711658"/>
+        <p14:creationId xmlns:p14="http://schemas.microsoft.com/office/powerpoint/2010/main" val="3996262828"/>
       </p:ext>
     </p:extLst>
   </p:cSld>
@@ -5843,143 +4418,6 @@
           <a:chExt cx="0" cy="0"/>
         </a:xfrm>
       </p:grpSpPr>
-      <p:sp>
-        <p:nvSpPr>
-          <p:cNvPr id="4" name="TextBox 3">
-            <a:extLst>
-              <a:ext uri="{FF2B5EF4-FFF2-40B4-BE49-F238E27FC236}">
-                <a16:creationId xmlns:a16="http://schemas.microsoft.com/office/drawing/2014/main" id="{045EBAC0-D53D-4EA9-B71F-B4ABEF313ECB}"/>
-              </a:ext>
-            </a:extLst>
-          </p:cNvPr>
-          <p:cNvSpPr txBox="1"/>
-          <p:nvPr/>
-        </p:nvSpPr>
-        <p:spPr>
-          <a:xfrm>
-            <a:off x="5847374" y="847899"/>
-            <a:ext cx="497252" cy="923330"/>
-          </a:xfrm>
-          <a:prstGeom prst="rect">
-            <a:avLst/>
-          </a:prstGeom>
-          <a:noFill/>
-        </p:spPr>
-        <p:txBody>
-          <a:bodyPr wrap="none" rtlCol="0">
-            <a:spAutoFit/>
-          </a:bodyPr>
-          <a:lstStyle/>
-          <a:p>
-            <a:r>
-              <a:rPr lang="en-US" sz="5400" dirty="0"/>
-              <a:t>7</a:t>
-            </a:r>
-          </a:p>
-        </p:txBody>
-      </p:sp>
-      <p:cxnSp>
-        <p:nvCxnSpPr>
-          <p:cNvPr id="6" name="Straight Connector 5">
-            <a:extLst>
-              <a:ext uri="{FF2B5EF4-FFF2-40B4-BE49-F238E27FC236}">
-                <a16:creationId xmlns:a16="http://schemas.microsoft.com/office/drawing/2014/main" id="{8C184E1D-CF59-4C96-8CCE-250D00DBE68C}"/>
-              </a:ext>
-            </a:extLst>
-          </p:cNvPr>
-          <p:cNvCxnSpPr>
-            <a:cxnSpLocks/>
-            <a:stCxn id="4" idx="2"/>
-          </p:cNvCxnSpPr>
-          <p:nvPr/>
-        </p:nvCxnSpPr>
-        <p:spPr>
-          <a:xfrm>
-            <a:off x="6096000" y="1771229"/>
-            <a:ext cx="0" cy="2875586"/>
-          </a:xfrm>
-          <a:prstGeom prst="line">
-            <a:avLst/>
-          </a:prstGeom>
-          <a:ln w="76200">
-            <a:solidFill>
-              <a:schemeClr val="tx1">
-                <a:lumMod val="50000"/>
-              </a:schemeClr>
-            </a:solidFill>
-          </a:ln>
-        </p:spPr>
-        <p:style>
-          <a:lnRef idx="1">
-            <a:schemeClr val="accent1"/>
-          </a:lnRef>
-          <a:fillRef idx="0">
-            <a:schemeClr val="accent1"/>
-          </a:fillRef>
-          <a:effectRef idx="0">
-            <a:schemeClr val="accent1"/>
-          </a:effectRef>
-          <a:fontRef idx="minor">
-            <a:schemeClr val="tx1"/>
-          </a:fontRef>
-        </p:style>
-      </p:cxnSp>
-      <p:sp>
-        <p:nvSpPr>
-          <p:cNvPr id="8" name="Oval 7">
-            <a:extLst>
-              <a:ext uri="{FF2B5EF4-FFF2-40B4-BE49-F238E27FC236}">
-                <a16:creationId xmlns:a16="http://schemas.microsoft.com/office/drawing/2014/main" id="{D780B0A6-9031-423A-8AC2-37C18347E369}"/>
-              </a:ext>
-            </a:extLst>
-          </p:cNvPr>
-          <p:cNvSpPr/>
-          <p:nvPr/>
-        </p:nvSpPr>
-        <p:spPr>
-          <a:xfrm>
-            <a:off x="5961613" y="2019994"/>
-            <a:ext cx="275706" cy="275706"/>
-          </a:xfrm>
-          <a:prstGeom prst="ellipse">
-            <a:avLst/>
-          </a:prstGeom>
-          <a:solidFill>
-            <a:schemeClr val="tx1">
-              <a:lumMod val="65000"/>
-            </a:schemeClr>
-          </a:solidFill>
-          <a:ln>
-            <a:solidFill>
-              <a:schemeClr val="tx1"/>
-            </a:solidFill>
-          </a:ln>
-        </p:spPr>
-        <p:style>
-          <a:lnRef idx="2">
-            <a:schemeClr val="accent1">
-              <a:shade val="50000"/>
-            </a:schemeClr>
-          </a:lnRef>
-          <a:fillRef idx="1">
-            <a:schemeClr val="accent1"/>
-          </a:fillRef>
-          <a:effectRef idx="0">
-            <a:schemeClr val="accent1"/>
-          </a:effectRef>
-          <a:fontRef idx="minor">
-            <a:schemeClr val="lt1"/>
-          </a:fontRef>
-        </p:style>
-        <p:txBody>
-          <a:bodyPr rtlCol="0" anchor="ctr"/>
-          <a:lstStyle/>
-          <a:p>
-            <a:pPr algn="ctr"/>
-            <a:endParaRPr lang="en-US"/>
-          </a:p>
-        </p:txBody>
-      </p:sp>
       <p:cxnSp>
         <p:nvCxnSpPr>
           <p:cNvPr id="10" name="Straight Arrow Connector 9">
@@ -5997,7 +4435,7 @@
         </p:nvCxnSpPr>
         <p:spPr>
           <a:xfrm flipH="1">
-            <a:off x="6650182" y="1246909"/>
+            <a:off x="7387754" y="4388042"/>
             <a:ext cx="1119594" cy="0"/>
           </a:xfrm>
           <a:prstGeom prst="straightConnector1">
@@ -6039,8 +4477,8 @@
         </p:nvSpPr>
         <p:spPr>
           <a:xfrm>
-            <a:off x="7769776" y="1062243"/>
-            <a:ext cx="2010487" cy="369332"/>
+            <a:off x="8507348" y="4203376"/>
+            <a:ext cx="3004349" cy="369332"/>
           </a:xfrm>
           <a:prstGeom prst="rect">
             <a:avLst/>
@@ -6055,64 +4493,172 @@
           <a:p>
             <a:r>
               <a:rPr lang="en-US" dirty="0"/>
-              <a:t>Odd number. Press F</a:t>
-            </a:r>
-          </a:p>
-        </p:txBody>
-      </p:sp>
-      <p:sp>
-        <p:nvSpPr>
-          <p:cNvPr id="7" name="TextBox 6">
+              <a:t>Face on bottom is angry. Press N</a:t>
+            </a:r>
+          </a:p>
+        </p:txBody>
+      </p:sp>
+      <p:grpSp>
+        <p:nvGrpSpPr>
+          <p:cNvPr id="7" name="Group 6">
             <a:extLst>
               <a:ext uri="{FF2B5EF4-FFF2-40B4-BE49-F238E27FC236}">
-                <a16:creationId xmlns:a16="http://schemas.microsoft.com/office/drawing/2014/main" id="{13381491-1677-4EE4-AFAE-DADB6416064E}"/>
+                <a16:creationId xmlns:a16="http://schemas.microsoft.com/office/drawing/2014/main" id="{59368371-B861-4B24-9FC8-C8254E504709}"/>
               </a:ext>
             </a:extLst>
           </p:cNvPr>
-          <p:cNvSpPr txBox="1"/>
+          <p:cNvGrpSpPr/>
           <p:nvPr/>
-        </p:nvSpPr>
-        <p:spPr>
+        </p:nvGrpSpPr>
+        <p:grpSpPr>
           <a:xfrm>
-            <a:off x="5847374" y="4646815"/>
-            <a:ext cx="497252" cy="923330"/>
+            <a:off x="4194889" y="780975"/>
+            <a:ext cx="2894783" cy="4601715"/>
+            <a:chOff x="2239226" y="2423141"/>
+            <a:chExt cx="1298597" cy="2064325"/>
           </a:xfrm>
-          <a:prstGeom prst="rect">
-            <a:avLst/>
-          </a:prstGeom>
-          <a:noFill/>
-        </p:spPr>
-        <p:txBody>
-          <a:bodyPr wrap="none" rtlCol="0">
-            <a:spAutoFit/>
-          </a:bodyPr>
-          <a:lstStyle/>
-          <a:p>
-            <a:r>
-              <a:rPr lang="en-US" sz="5400" dirty="0"/>
-              <a:t>3</a:t>
-            </a:r>
-          </a:p>
-        </p:txBody>
-      </p:sp>
+        </p:grpSpPr>
+        <p:sp>
+          <p:nvSpPr>
+            <p:cNvPr id="9" name="Rectangle 8">
+              <a:extLst>
+                <a:ext uri="{FF2B5EF4-FFF2-40B4-BE49-F238E27FC236}">
+                  <a16:creationId xmlns:a16="http://schemas.microsoft.com/office/drawing/2014/main" id="{E33E69C8-8389-4F64-B64F-B1BF66EA84FA}"/>
+                </a:ext>
+              </a:extLst>
+            </p:cNvPr>
+            <p:cNvSpPr/>
+            <p:nvPr/>
+          </p:nvSpPr>
+          <p:spPr>
+            <a:xfrm>
+              <a:off x="2239226" y="2423141"/>
+              <a:ext cx="1298597" cy="2064325"/>
+            </a:xfrm>
+            <a:prstGeom prst="rect">
+              <a:avLst/>
+            </a:prstGeom>
+            <a:solidFill>
+              <a:schemeClr val="bg1"/>
+            </a:solidFill>
+            <a:ln w="38100">
+              <a:solidFill>
+                <a:schemeClr val="tx1"/>
+              </a:solidFill>
+            </a:ln>
+          </p:spPr>
+          <p:style>
+            <a:lnRef idx="2">
+              <a:schemeClr val="accent1">
+                <a:shade val="50000"/>
+              </a:schemeClr>
+            </a:lnRef>
+            <a:fillRef idx="1">
+              <a:schemeClr val="accent1"/>
+            </a:fillRef>
+            <a:effectRef idx="0">
+              <a:schemeClr val="accent1"/>
+            </a:effectRef>
+            <a:fontRef idx="minor">
+              <a:schemeClr val="lt1"/>
+            </a:fontRef>
+          </p:style>
+          <p:txBody>
+            <a:bodyPr rtlCol="0" anchor="ctr"/>
+            <a:lstStyle/>
+            <a:p>
+              <a:pPr algn="ctr"/>
+              <a:r>
+                <a:rPr lang="en-US" dirty="0"/>
+                <a:t>+</a:t>
+              </a:r>
+            </a:p>
+          </p:txBody>
+        </p:sp>
+        <p:pic>
+          <p:nvPicPr>
+            <p:cNvPr id="12" name="Picture 11">
+              <a:extLst>
+                <a:ext uri="{FF2B5EF4-FFF2-40B4-BE49-F238E27FC236}">
+                  <a16:creationId xmlns:a16="http://schemas.microsoft.com/office/drawing/2014/main" id="{63F39C27-CE35-49F1-AC62-69A7BD1CB85F}"/>
+                </a:ext>
+              </a:extLst>
+            </p:cNvPr>
+            <p:cNvPicPr>
+              <a:picLocks noChangeAspect="1"/>
+            </p:cNvPicPr>
+            <p:nvPr/>
+          </p:nvPicPr>
+          <p:blipFill>
+            <a:blip r:embed="rId2">
+              <a:extLst>
+                <a:ext uri="{28A0092B-C50C-407E-A947-70E740481C1C}">
+                  <a14:useLocalDpi xmlns:a14="http://schemas.microsoft.com/office/drawing/2010/main" val="0"/>
+                </a:ext>
+              </a:extLst>
+            </a:blip>
+            <a:srcRect/>
+            <a:stretch/>
+          </p:blipFill>
+          <p:spPr>
+            <a:xfrm>
+              <a:off x="2630542" y="3660331"/>
+              <a:ext cx="515966" cy="698705"/>
+            </a:xfrm>
+            <a:prstGeom prst="rect">
+              <a:avLst/>
+            </a:prstGeom>
+          </p:spPr>
+        </p:pic>
+      </p:grpSp>
+    </p:spTree>
+    <p:extLst>
+      <p:ext uri="{BB962C8B-B14F-4D97-AF65-F5344CB8AC3E}">
+        <p14:creationId xmlns:p14="http://schemas.microsoft.com/office/powerpoint/2010/main" val="442400796"/>
+      </p:ext>
+    </p:extLst>
+  </p:cSld>
+  <p:clrMapOvr>
+    <a:masterClrMapping/>
+  </p:clrMapOvr>
+</p:sld>
+</file>
+
+<file path=ppt/slides/slide9.xml><?xml version="1.0" encoding="utf-8"?>
+<p:sld xmlns:a="http://schemas.openxmlformats.org/drawingml/2006/main" xmlns:r="http://schemas.openxmlformats.org/officeDocument/2006/relationships" xmlns:p="http://schemas.openxmlformats.org/presentationml/2006/main">
+  <p:cSld>
+    <p:spTree>
+      <p:nvGrpSpPr>
+        <p:cNvPr id="1" name=""/>
+        <p:cNvGrpSpPr/>
+        <p:nvPr/>
+      </p:nvGrpSpPr>
+      <p:grpSpPr>
+        <a:xfrm>
+          <a:off x="0" y="0"/>
+          <a:ext cx="0" cy="0"/>
+          <a:chOff x="0" y="0"/>
+          <a:chExt cx="0" cy="0"/>
+        </a:xfrm>
+      </p:grpSpPr>
       <p:cxnSp>
         <p:nvCxnSpPr>
-          <p:cNvPr id="9" name="Straight Arrow Connector 8">
+          <p:cNvPr id="10" name="Straight Arrow Connector 9">
             <a:extLst>
               <a:ext uri="{FF2B5EF4-FFF2-40B4-BE49-F238E27FC236}">
-                <a16:creationId xmlns:a16="http://schemas.microsoft.com/office/drawing/2014/main" id="{1535B23B-667E-46EB-B811-2ABC7CFCB5A7}"/>
+                <a16:creationId xmlns:a16="http://schemas.microsoft.com/office/drawing/2014/main" id="{87A68CCB-8D05-4BD9-BDDE-EE29FEECE518}"/>
               </a:ext>
             </a:extLst>
           </p:cNvPr>
           <p:cNvCxnSpPr>
             <a:cxnSpLocks/>
-            <a:stCxn id="12" idx="1"/>
+            <a:stCxn id="11" idx="1"/>
           </p:cNvCxnSpPr>
           <p:nvPr/>
         </p:nvCxnSpPr>
         <p:spPr>
           <a:xfrm flipH="1">
-            <a:off x="6535882" y="2185610"/>
+            <a:off x="7387754" y="4388042"/>
             <a:ext cx="1119594" cy="0"/>
           </a:xfrm>
           <a:prstGeom prst="straightConnector1">
@@ -6142,253 +4688,6 @@
       </p:cxnSp>
       <p:sp>
         <p:nvSpPr>
-          <p:cNvPr id="12" name="TextBox 11">
-            <a:extLst>
-              <a:ext uri="{FF2B5EF4-FFF2-40B4-BE49-F238E27FC236}">
-                <a16:creationId xmlns:a16="http://schemas.microsoft.com/office/drawing/2014/main" id="{0282A9FE-C87A-4414-A276-329E8AF62300}"/>
-              </a:ext>
-            </a:extLst>
-          </p:cNvPr>
-          <p:cNvSpPr txBox="1"/>
-          <p:nvPr/>
-        </p:nvSpPr>
-        <p:spPr>
-          <a:xfrm>
-            <a:off x="7655476" y="2000944"/>
-            <a:ext cx="3502882" cy="369332"/>
-          </a:xfrm>
-          <a:prstGeom prst="rect">
-            <a:avLst/>
-          </a:prstGeom>
-          <a:noFill/>
-        </p:spPr>
-        <p:txBody>
-          <a:bodyPr wrap="none" rtlCol="0">
-            <a:spAutoFit/>
-          </a:bodyPr>
-          <a:lstStyle/>
-          <a:p>
-            <a:r>
-              <a:rPr lang="en-US" dirty="0"/>
-              <a:t>Circle is at top. Ignore bottom number</a:t>
-            </a:r>
-          </a:p>
-        </p:txBody>
-      </p:sp>
-    </p:spTree>
-    <p:extLst>
-      <p:ext uri="{BB962C8B-B14F-4D97-AF65-F5344CB8AC3E}">
-        <p14:creationId xmlns:p14="http://schemas.microsoft.com/office/powerpoint/2010/main" val="3380343371"/>
-      </p:ext>
-    </p:extLst>
-  </p:cSld>
-  <p:clrMapOvr>
-    <a:masterClrMapping/>
-  </p:clrMapOvr>
-</p:sld>
-</file>
-
-<file path=ppt/slides/slide9.xml><?xml version="1.0" encoding="utf-8"?>
-<p:sld xmlns:a="http://schemas.openxmlformats.org/drawingml/2006/main" xmlns:r="http://schemas.openxmlformats.org/officeDocument/2006/relationships" xmlns:p="http://schemas.openxmlformats.org/presentationml/2006/main">
-  <p:cSld>
-    <p:spTree>
-      <p:nvGrpSpPr>
-        <p:cNvPr id="1" name=""/>
-        <p:cNvGrpSpPr/>
-        <p:nvPr/>
-      </p:nvGrpSpPr>
-      <p:grpSpPr>
-        <a:xfrm>
-          <a:off x="0" y="0"/>
-          <a:ext cx="0" cy="0"/>
-          <a:chOff x="0" y="0"/>
-          <a:chExt cx="0" cy="0"/>
-        </a:xfrm>
-      </p:grpSpPr>
-      <p:sp>
-        <p:nvSpPr>
-          <p:cNvPr id="4" name="TextBox 3">
-            <a:extLst>
-              <a:ext uri="{FF2B5EF4-FFF2-40B4-BE49-F238E27FC236}">
-                <a16:creationId xmlns:a16="http://schemas.microsoft.com/office/drawing/2014/main" id="{045EBAC0-D53D-4EA9-B71F-B4ABEF313ECB}"/>
-              </a:ext>
-            </a:extLst>
-          </p:cNvPr>
-          <p:cNvSpPr txBox="1"/>
-          <p:nvPr/>
-        </p:nvSpPr>
-        <p:spPr>
-          <a:xfrm>
-            <a:off x="5847374" y="847899"/>
-            <a:ext cx="497252" cy="923330"/>
-          </a:xfrm>
-          <a:prstGeom prst="rect">
-            <a:avLst/>
-          </a:prstGeom>
-          <a:noFill/>
-        </p:spPr>
-        <p:txBody>
-          <a:bodyPr wrap="none" rtlCol="0">
-            <a:spAutoFit/>
-          </a:bodyPr>
-          <a:lstStyle/>
-          <a:p>
-            <a:r>
-              <a:rPr lang="en-US" sz="5400" dirty="0"/>
-              <a:t>9</a:t>
-            </a:r>
-          </a:p>
-        </p:txBody>
-      </p:sp>
-      <p:cxnSp>
-        <p:nvCxnSpPr>
-          <p:cNvPr id="6" name="Straight Connector 5">
-            <a:extLst>
-              <a:ext uri="{FF2B5EF4-FFF2-40B4-BE49-F238E27FC236}">
-                <a16:creationId xmlns:a16="http://schemas.microsoft.com/office/drawing/2014/main" id="{8C184E1D-CF59-4C96-8CCE-250D00DBE68C}"/>
-              </a:ext>
-            </a:extLst>
-          </p:cNvPr>
-          <p:cNvCxnSpPr>
-            <a:cxnSpLocks/>
-            <a:stCxn id="4" idx="2"/>
-          </p:cNvCxnSpPr>
-          <p:nvPr/>
-        </p:nvCxnSpPr>
-        <p:spPr>
-          <a:xfrm>
-            <a:off x="6096000" y="1771229"/>
-            <a:ext cx="0" cy="2875586"/>
-          </a:xfrm>
-          <a:prstGeom prst="line">
-            <a:avLst/>
-          </a:prstGeom>
-          <a:ln w="76200">
-            <a:solidFill>
-              <a:schemeClr val="tx1">
-                <a:lumMod val="50000"/>
-              </a:schemeClr>
-            </a:solidFill>
-          </a:ln>
-        </p:spPr>
-        <p:style>
-          <a:lnRef idx="1">
-            <a:schemeClr val="accent1"/>
-          </a:lnRef>
-          <a:fillRef idx="0">
-            <a:schemeClr val="accent1"/>
-          </a:fillRef>
-          <a:effectRef idx="0">
-            <a:schemeClr val="accent1"/>
-          </a:effectRef>
-          <a:fontRef idx="minor">
-            <a:schemeClr val="tx1"/>
-          </a:fontRef>
-        </p:style>
-      </p:cxnSp>
-      <p:sp>
-        <p:nvSpPr>
-          <p:cNvPr id="8" name="Oval 7">
-            <a:extLst>
-              <a:ext uri="{FF2B5EF4-FFF2-40B4-BE49-F238E27FC236}">
-                <a16:creationId xmlns:a16="http://schemas.microsoft.com/office/drawing/2014/main" id="{D780B0A6-9031-423A-8AC2-37C18347E369}"/>
-              </a:ext>
-            </a:extLst>
-          </p:cNvPr>
-          <p:cNvSpPr/>
-          <p:nvPr/>
-        </p:nvSpPr>
-        <p:spPr>
-          <a:xfrm>
-            <a:off x="5961613" y="2019994"/>
-            <a:ext cx="275706" cy="275706"/>
-          </a:xfrm>
-          <a:prstGeom prst="ellipse">
-            <a:avLst/>
-          </a:prstGeom>
-          <a:solidFill>
-            <a:schemeClr val="tx1">
-              <a:lumMod val="65000"/>
-            </a:schemeClr>
-          </a:solidFill>
-          <a:ln>
-            <a:solidFill>
-              <a:schemeClr val="tx1"/>
-            </a:solidFill>
-          </a:ln>
-        </p:spPr>
-        <p:style>
-          <a:lnRef idx="2">
-            <a:schemeClr val="accent1">
-              <a:shade val="50000"/>
-            </a:schemeClr>
-          </a:lnRef>
-          <a:fillRef idx="1">
-            <a:schemeClr val="accent1"/>
-          </a:fillRef>
-          <a:effectRef idx="0">
-            <a:schemeClr val="accent1"/>
-          </a:effectRef>
-          <a:fontRef idx="minor">
-            <a:schemeClr val="lt1"/>
-          </a:fontRef>
-        </p:style>
-        <p:txBody>
-          <a:bodyPr rtlCol="0" anchor="ctr"/>
-          <a:lstStyle/>
-          <a:p>
-            <a:pPr algn="ctr"/>
-            <a:endParaRPr lang="en-US"/>
-          </a:p>
-        </p:txBody>
-      </p:sp>
-      <p:cxnSp>
-        <p:nvCxnSpPr>
-          <p:cNvPr id="10" name="Straight Arrow Connector 9">
-            <a:extLst>
-              <a:ext uri="{FF2B5EF4-FFF2-40B4-BE49-F238E27FC236}">
-                <a16:creationId xmlns:a16="http://schemas.microsoft.com/office/drawing/2014/main" id="{87A68CCB-8D05-4BD9-BDDE-EE29FEECE518}"/>
-              </a:ext>
-            </a:extLst>
-          </p:cNvPr>
-          <p:cNvCxnSpPr>
-            <a:cxnSpLocks/>
-            <a:stCxn id="11" idx="1"/>
-          </p:cNvCxnSpPr>
-          <p:nvPr/>
-        </p:nvCxnSpPr>
-        <p:spPr>
-          <a:xfrm flipH="1">
-            <a:off x="6650182" y="1246909"/>
-            <a:ext cx="1119594" cy="0"/>
-          </a:xfrm>
-          <a:prstGeom prst="straightConnector1">
-            <a:avLst/>
-          </a:prstGeom>
-          <a:ln w="57150">
-            <a:solidFill>
-              <a:srgbClr val="FFC000"/>
-            </a:solidFill>
-            <a:tailEnd type="triangle"/>
-          </a:ln>
-        </p:spPr>
-        <p:style>
-          <a:lnRef idx="1">
-            <a:schemeClr val="accent1"/>
-          </a:lnRef>
-          <a:fillRef idx="0">
-            <a:schemeClr val="accent1"/>
-          </a:fillRef>
-          <a:effectRef idx="0">
-            <a:schemeClr val="accent1"/>
-          </a:effectRef>
-          <a:fontRef idx="minor">
-            <a:schemeClr val="tx1"/>
-          </a:fontRef>
-        </p:style>
-      </p:cxnSp>
-      <p:sp>
-        <p:nvSpPr>
           <p:cNvPr id="11" name="TextBox 10">
             <a:extLst>
               <a:ext uri="{FF2B5EF4-FFF2-40B4-BE49-F238E27FC236}">
@@ -6401,8 +4700,8 @@
         </p:nvSpPr>
         <p:spPr>
           <a:xfrm>
-            <a:off x="7769776" y="1062243"/>
-            <a:ext cx="2010487" cy="369332"/>
+            <a:off x="8507348" y="4203376"/>
+            <a:ext cx="3012363" cy="369332"/>
           </a:xfrm>
           <a:prstGeom prst="rect">
             <a:avLst/>
@@ -6417,15 +4716,128 @@
           <a:p>
             <a:r>
               <a:rPr lang="en-US" dirty="0"/>
-              <a:t>Odd number. Press F</a:t>
-            </a:r>
-          </a:p>
-        </p:txBody>
-      </p:sp>
+              <a:t>Face on bottom is happy. Press B</a:t>
+            </a:r>
+          </a:p>
+        </p:txBody>
+      </p:sp>
+      <p:grpSp>
+        <p:nvGrpSpPr>
+          <p:cNvPr id="2" name="Group 1">
+            <a:extLst>
+              <a:ext uri="{FF2B5EF4-FFF2-40B4-BE49-F238E27FC236}">
+                <a16:creationId xmlns:a16="http://schemas.microsoft.com/office/drawing/2014/main" id="{75D49323-C6A1-4246-8F3E-85F8FF09DB67}"/>
+              </a:ext>
+            </a:extLst>
+          </p:cNvPr>
+          <p:cNvGrpSpPr/>
+          <p:nvPr/>
+        </p:nvGrpSpPr>
+        <p:grpSpPr>
+          <a:xfrm>
+            <a:off x="4194889" y="780975"/>
+            <a:ext cx="2894783" cy="4601715"/>
+            <a:chOff x="4194889" y="780975"/>
+            <a:chExt cx="2894783" cy="4601715"/>
+          </a:xfrm>
+        </p:grpSpPr>
+        <p:sp>
+          <p:nvSpPr>
+            <p:cNvPr id="9" name="Rectangle 8">
+              <a:extLst>
+                <a:ext uri="{FF2B5EF4-FFF2-40B4-BE49-F238E27FC236}">
+                  <a16:creationId xmlns:a16="http://schemas.microsoft.com/office/drawing/2014/main" id="{E33E69C8-8389-4F64-B64F-B1BF66EA84FA}"/>
+                </a:ext>
+              </a:extLst>
+            </p:cNvPr>
+            <p:cNvSpPr/>
+            <p:nvPr/>
+          </p:nvSpPr>
+          <p:spPr>
+            <a:xfrm>
+              <a:off x="4194889" y="780975"/>
+              <a:ext cx="2894783" cy="4601715"/>
+            </a:xfrm>
+            <a:prstGeom prst="rect">
+              <a:avLst/>
+            </a:prstGeom>
+            <a:solidFill>
+              <a:schemeClr val="bg1"/>
+            </a:solidFill>
+            <a:ln w="38100">
+              <a:solidFill>
+                <a:schemeClr val="tx1"/>
+              </a:solidFill>
+            </a:ln>
+          </p:spPr>
+          <p:style>
+            <a:lnRef idx="2">
+              <a:schemeClr val="accent1">
+                <a:shade val="50000"/>
+              </a:schemeClr>
+            </a:lnRef>
+            <a:fillRef idx="1">
+              <a:schemeClr val="accent1"/>
+            </a:fillRef>
+            <a:effectRef idx="0">
+              <a:schemeClr val="accent1"/>
+            </a:effectRef>
+            <a:fontRef idx="minor">
+              <a:schemeClr val="lt1"/>
+            </a:fontRef>
+          </p:style>
+          <p:txBody>
+            <a:bodyPr rtlCol="0" anchor="ctr"/>
+            <a:lstStyle/>
+            <a:p>
+              <a:pPr algn="ctr"/>
+              <a:r>
+                <a:rPr lang="en-US" dirty="0"/>
+                <a:t>+</a:t>
+              </a:r>
+            </a:p>
+          </p:txBody>
+        </p:sp>
+        <p:pic>
+          <p:nvPicPr>
+            <p:cNvPr id="8" name="Picture 7">
+              <a:extLst>
+                <a:ext uri="{FF2B5EF4-FFF2-40B4-BE49-F238E27FC236}">
+                  <a16:creationId xmlns:a16="http://schemas.microsoft.com/office/drawing/2014/main" id="{47100211-1901-43F0-A5F1-998F04CB44BD}"/>
+                </a:ext>
+              </a:extLst>
+            </p:cNvPr>
+            <p:cNvPicPr>
+              <a:picLocks noChangeAspect="1"/>
+            </p:cNvPicPr>
+            <p:nvPr/>
+          </p:nvPicPr>
+          <p:blipFill>
+            <a:blip r:embed="rId2">
+              <a:extLst>
+                <a:ext uri="{28A0092B-C50C-407E-A947-70E740481C1C}">
+                  <a14:useLocalDpi xmlns:a14="http://schemas.microsoft.com/office/drawing/2010/main" val="0"/>
+                </a:ext>
+              </a:extLst>
+            </a:blip>
+            <a:srcRect/>
+            <a:stretch/>
+          </p:blipFill>
+          <p:spPr>
+            <a:xfrm>
+              <a:off x="5067194" y="3538873"/>
+              <a:ext cx="1150172" cy="1557528"/>
+            </a:xfrm>
+            <a:prstGeom prst="rect">
+              <a:avLst/>
+            </a:prstGeom>
+          </p:spPr>
+        </p:pic>
+      </p:grpSp>
     </p:spTree>
     <p:extLst>
       <p:ext uri="{BB962C8B-B14F-4D97-AF65-F5344CB8AC3E}">
-        <p14:creationId xmlns:p14="http://schemas.microsoft.com/office/powerpoint/2010/main" val="3684722757"/>
+        <p14:creationId xmlns:p14="http://schemas.microsoft.com/office/powerpoint/2010/main" val="2746823336"/>
       </p:ext>
     </p:extLst>
   </p:cSld>

</xml_diff>